<commit_message>
Added more to the numpy and pandas slides.  Also added some material to Module 1
</commit_message>
<xml_diff>
--- a/docs/Module 2.pptx
+++ b/docs/Module 2.pptx
@@ -40,6 +40,18 @@
     <p:sldId id="287" r:id="rId35"/>
     <p:sldId id="288" r:id="rId36"/>
     <p:sldId id="289" r:id="rId37"/>
+    <p:sldId id="290" r:id="rId38"/>
+    <p:sldId id="291" r:id="rId39"/>
+    <p:sldId id="292" r:id="rId40"/>
+    <p:sldId id="293" r:id="rId41"/>
+    <p:sldId id="294" r:id="rId42"/>
+    <p:sldId id="295" r:id="rId43"/>
+    <p:sldId id="296" r:id="rId44"/>
+    <p:sldId id="297" r:id="rId45"/>
+    <p:sldId id="298" r:id="rId46"/>
+    <p:sldId id="299" r:id="rId47"/>
+    <p:sldId id="300" r:id="rId48"/>
+    <p:sldId id="301" r:id="rId49"/>
   </p:sldIdLst>
   <p:sldSz cx="10080625" cy="7559675"/>
   <p:notesSz cx="7559675" cy="10691812"/>
@@ -10304,7 +10316,7 @@
                 <a:latin typeface="Arial"/>
                 <a:ea typeface="DejaVu Sans"/>
               </a:rPr>
-              <a:t>Introduction to Numpy</a:t>
+              <a:t>Introduction to Pandas</a:t>
             </a:r>
             <a:endParaRPr b="0" lang="en-IE" sz="4400" spc="-1" strike="noStrike">
               <a:latin typeface="Arial"/>
@@ -10502,7 +10514,7 @@
                 <a:latin typeface="Arial"/>
                 <a:ea typeface="DejaVu Sans"/>
               </a:rPr>
-              <a:t>Introduction to Numpy</a:t>
+              <a:t>Introduction to Pandas</a:t>
             </a:r>
             <a:endParaRPr b="0" lang="en-IE" sz="4400" spc="-1" strike="noStrike">
               <a:latin typeface="Arial"/>
@@ -11014,7 +11026,7 @@
                 <a:latin typeface="Arial"/>
                 <a:ea typeface="DejaVu Sans"/>
               </a:rPr>
-              <a:t>Introduction to Numpy</a:t>
+              <a:t>Introduction to Pandas</a:t>
             </a:r>
             <a:endParaRPr b="0" lang="en-IE" sz="4400" spc="-1" strike="noStrike">
               <a:latin typeface="Arial"/>
@@ -11152,6 +11164,1292 @@
           <p:childTnLst>
             <p:seq>
               <p:cTn id="68" dur="indefinite" nodeType="mainSeq"/>
+              <p:prevCondLst>
+                <p:cond delay="0" evt="onPrev">
+                  <p:tgtEl>
+                    <p:sldTgt/>
+                  </p:tgtEl>
+                </p:cond>
+              </p:prevCondLst>
+              <p:nextCondLst>
+                <p:cond delay="0" evt="onNext">
+                  <p:tgtEl>
+                    <p:sldTgt/>
+                  </p:tgtEl>
+                </p:cond>
+              </p:nextCondLst>
+            </p:seq>
+          </p:childTnLst>
+        </p:cTn>
+      </p:par>
+    </p:tnLst>
+  </p:timing>
+</p:sld>
+</file>
+
+<file path=ppt/slides/slide35.xml><?xml version="1.0" encoding="utf-8"?>
+<p:sld xmlns:a="http://schemas.openxmlformats.org/drawingml/2006/main" xmlns:p="http://schemas.openxmlformats.org/presentationml/2006/main" xmlns:r="http://schemas.openxmlformats.org/officeDocument/2006/relationships" xmlns:p14="http://schemas.microsoft.com/office/powerpoint/2010/main" xmlns:p15="http://schemas.microsoft.com/office/powerpoint/2012/main" xmlns:mc="http://schemas.openxmlformats.org/markup-compatibility/2006">
+  <p:cSld>
+    <p:spTree>
+      <p:nvGrpSpPr>
+        <p:cNvPr id="1" name=""/>
+        <p:cNvGrpSpPr/>
+        <p:nvPr/>
+      </p:nvGrpSpPr>
+      <p:grpSpPr>
+        <a:xfrm>
+          <a:off x="0" y="0"/>
+          <a:ext cx="0" cy="0"/>
+          <a:chOff x="0" y="0"/>
+          <a:chExt cx="0" cy="0"/>
+        </a:xfrm>
+      </p:grpSpPr>
+      <p:sp>
+        <p:nvSpPr>
+          <p:cNvPr id="157" name="CustomShape 1"/>
+          <p:cNvSpPr/>
+          <p:nvPr/>
+        </p:nvSpPr>
+        <p:spPr>
+          <a:xfrm>
+            <a:off x="504000" y="301320"/>
+            <a:ext cx="9070560" cy="636480"/>
+          </a:xfrm>
+          <a:prstGeom prst="rect">
+            <a:avLst/>
+          </a:prstGeom>
+          <a:noFill/>
+          <a:ln>
+            <a:noFill/>
+          </a:ln>
+        </p:spPr>
+        <p:style>
+          <a:lnRef idx="0"/>
+          <a:fillRef idx="0"/>
+          <a:effectRef idx="0"/>
+          <a:fontRef idx="minor"/>
+        </p:style>
+        <p:txBody>
+          <a:bodyPr lIns="0" rIns="0" tIns="0" bIns="0" anchor="ctr"/>
+          <a:p>
+            <a:pPr algn="ctr">
+              <a:lnSpc>
+                <a:spcPct val="100000"/>
+              </a:lnSpc>
+            </a:pPr>
+            <a:r>
+              <a:rPr b="0" lang="en-IE" sz="4400" spc="-1" strike="noStrike">
+                <a:solidFill>
+                  <a:srgbClr val="ffffff"/>
+                </a:solidFill>
+                <a:latin typeface="Arial"/>
+                <a:ea typeface="DejaVu Sans"/>
+              </a:rPr>
+              <a:t>Introduction to Pandas</a:t>
+            </a:r>
+            <a:endParaRPr b="0" lang="en-IE" sz="4400" spc="-1" strike="noStrike">
+              <a:latin typeface="Arial"/>
+            </a:endParaRPr>
+          </a:p>
+        </p:txBody>
+      </p:sp>
+      <p:sp>
+        <p:nvSpPr>
+          <p:cNvPr id="158" name="CustomShape 2"/>
+          <p:cNvSpPr/>
+          <p:nvPr/>
+        </p:nvSpPr>
+        <p:spPr>
+          <a:xfrm>
+            <a:off x="504000" y="1769040"/>
+            <a:ext cx="9070560" cy="4383360"/>
+          </a:xfrm>
+          <a:prstGeom prst="rect">
+            <a:avLst/>
+          </a:prstGeom>
+          <a:noFill/>
+          <a:ln>
+            <a:noFill/>
+          </a:ln>
+        </p:spPr>
+        <p:style>
+          <a:lnRef idx="0"/>
+          <a:fillRef idx="0"/>
+          <a:effectRef idx="0"/>
+          <a:fontRef idx="minor"/>
+        </p:style>
+        <p:txBody>
+          <a:bodyPr lIns="0" rIns="0" tIns="0" bIns="0"/>
+          <a:p>
+            <a:pPr>
+              <a:lnSpc>
+                <a:spcPct val="100000"/>
+              </a:lnSpc>
+              <a:spcBef>
+                <a:spcPts val="1417"/>
+              </a:spcBef>
+            </a:pPr>
+            <a:endParaRPr b="0" lang="en-IE" sz="1800" spc="-1" strike="noStrike">
+              <a:latin typeface="Arial"/>
+            </a:endParaRPr>
+          </a:p>
+          <a:p>
+            <a:pPr marL="432000" indent="-322920">
+              <a:lnSpc>
+                <a:spcPct val="100000"/>
+              </a:lnSpc>
+              <a:spcBef>
+                <a:spcPts val="1417"/>
+              </a:spcBef>
+              <a:buClr>
+                <a:srgbClr val="000000"/>
+              </a:buClr>
+              <a:buSzPct val="45000"/>
+              <a:buFont typeface="Wingdings" charset="2"/>
+              <a:buChar char=""/>
+            </a:pPr>
+            <a:r>
+              <a:rPr b="0" lang="en-IE" sz="2800" spc="-1" strike="noStrike">
+                <a:solidFill>
+                  <a:srgbClr val="0066cc"/>
+                </a:solidFill>
+                <a:latin typeface="Arial"/>
+                <a:ea typeface="DejaVu Sans"/>
+              </a:rPr>
+              <a:t>The most commonly used of the three data structures </a:t>
+            </a:r>
+            <a:r>
+              <a:rPr b="0" lang="en-IE" sz="2800" spc="-1" strike="noStrike">
+                <a:solidFill>
+                  <a:srgbClr val="0066cc"/>
+                </a:solidFill>
+                <a:latin typeface="Arial"/>
+                <a:ea typeface="DejaVu Sans"/>
+              </a:rPr>
+              <a:t>is the </a:t>
+            </a:r>
+            <a:r>
+              <a:rPr b="0" i="1" lang="en-IE" sz="2800" spc="-1" strike="noStrike">
+                <a:solidFill>
+                  <a:srgbClr val="0066cc"/>
+                </a:solidFill>
+                <a:latin typeface="Arial"/>
+                <a:ea typeface="DejaVu Sans"/>
+              </a:rPr>
+              <a:t>dataframe</a:t>
+            </a:r>
+            <a:r>
+              <a:rPr b="0" lang="en-IE" sz="2800" spc="-1" strike="noStrike">
+                <a:solidFill>
+                  <a:srgbClr val="0066cc"/>
+                </a:solidFill>
+                <a:latin typeface="Arial"/>
+                <a:ea typeface="DejaVu Sans"/>
+              </a:rPr>
+              <a:t>.  The Pandas series has some use as </a:t>
+            </a:r>
+            <a:r>
+              <a:rPr b="0" lang="en-IE" sz="2800" spc="-1" strike="noStrike">
+                <a:solidFill>
+                  <a:srgbClr val="0066cc"/>
+                </a:solidFill>
+                <a:latin typeface="Arial"/>
+                <a:ea typeface="DejaVu Sans"/>
+              </a:rPr>
+              <a:t>well, however, Panels are rarely used in Pandas </a:t>
+            </a:r>
+            <a:r>
+              <a:rPr b="0" lang="en-IE" sz="2800" spc="-1" strike="noStrike">
+                <a:solidFill>
+                  <a:srgbClr val="0066cc"/>
+                </a:solidFill>
+                <a:latin typeface="Arial"/>
+                <a:ea typeface="DejaVu Sans"/>
+              </a:rPr>
+              <a:t>applications. </a:t>
+            </a:r>
+            <a:endParaRPr b="0" lang="en-IE" sz="2800" spc="-1" strike="noStrike">
+              <a:latin typeface="Arial"/>
+            </a:endParaRPr>
+          </a:p>
+          <a:p>
+            <a:pPr marL="432000" indent="-322920">
+              <a:lnSpc>
+                <a:spcPct val="100000"/>
+              </a:lnSpc>
+              <a:spcBef>
+                <a:spcPts val="1417"/>
+              </a:spcBef>
+              <a:buClr>
+                <a:srgbClr val="000000"/>
+              </a:buClr>
+              <a:buSzPct val="45000"/>
+              <a:buFont typeface="Wingdings" charset="2"/>
+              <a:buChar char=""/>
+            </a:pPr>
+            <a:r>
+              <a:rPr b="0" lang="en-IE" sz="2800" spc="-1" strike="noStrike">
+                <a:solidFill>
+                  <a:srgbClr val="0066cc"/>
+                </a:solidFill>
+                <a:latin typeface="Arial"/>
+                <a:ea typeface="DejaVu Sans"/>
+              </a:rPr>
+              <a:t>Following is an example of creating a Pandas </a:t>
+            </a:r>
+            <a:r>
+              <a:rPr b="0" lang="en-IE" sz="2800" spc="-1" strike="noStrike">
+                <a:solidFill>
+                  <a:srgbClr val="0066cc"/>
+                </a:solidFill>
+                <a:latin typeface="Arial"/>
+                <a:ea typeface="DejaVu Sans"/>
+              </a:rPr>
+              <a:t>dataframe from a Python list. </a:t>
+            </a:r>
+            <a:endParaRPr b="0" lang="en-IE" sz="2800" spc="-1" strike="noStrike">
+              <a:latin typeface="Arial"/>
+            </a:endParaRPr>
+          </a:p>
+        </p:txBody>
+      </p:sp>
+    </p:spTree>
+  </p:cSld>
+  <p:timing>
+    <p:tnLst>
+      <p:par>
+        <p:cTn id="69" dur="indefinite" restart="never" nodeType="tmRoot">
+          <p:childTnLst>
+            <p:seq>
+              <p:cTn id="70" dur="indefinite" nodeType="mainSeq"/>
+              <p:prevCondLst>
+                <p:cond delay="0" evt="onPrev">
+                  <p:tgtEl>
+                    <p:sldTgt/>
+                  </p:tgtEl>
+                </p:cond>
+              </p:prevCondLst>
+              <p:nextCondLst>
+                <p:cond delay="0" evt="onNext">
+                  <p:tgtEl>
+                    <p:sldTgt/>
+                  </p:tgtEl>
+                </p:cond>
+              </p:nextCondLst>
+            </p:seq>
+          </p:childTnLst>
+        </p:cTn>
+      </p:par>
+    </p:tnLst>
+  </p:timing>
+</p:sld>
+</file>
+
+<file path=ppt/slides/slide36.xml><?xml version="1.0" encoding="utf-8"?>
+<p:sld xmlns:a="http://schemas.openxmlformats.org/drawingml/2006/main" xmlns:p="http://schemas.openxmlformats.org/presentationml/2006/main" xmlns:r="http://schemas.openxmlformats.org/officeDocument/2006/relationships" xmlns:p14="http://schemas.microsoft.com/office/powerpoint/2010/main" xmlns:p15="http://schemas.microsoft.com/office/powerpoint/2012/main" xmlns:mc="http://schemas.openxmlformats.org/markup-compatibility/2006">
+  <p:cSld>
+    <p:spTree>
+      <p:nvGrpSpPr>
+        <p:cNvPr id="1" name=""/>
+        <p:cNvGrpSpPr/>
+        <p:nvPr/>
+      </p:nvGrpSpPr>
+      <p:grpSpPr>
+        <a:xfrm>
+          <a:off x="0" y="0"/>
+          <a:ext cx="0" cy="0"/>
+          <a:chOff x="0" y="0"/>
+          <a:chExt cx="0" cy="0"/>
+        </a:xfrm>
+      </p:grpSpPr>
+      <p:sp>
+        <p:nvSpPr>
+          <p:cNvPr id="159" name="CustomShape 1"/>
+          <p:cNvSpPr/>
+          <p:nvPr/>
+        </p:nvSpPr>
+        <p:spPr>
+          <a:xfrm>
+            <a:off x="504000" y="301320"/>
+            <a:ext cx="9070560" cy="636480"/>
+          </a:xfrm>
+          <a:prstGeom prst="rect">
+            <a:avLst/>
+          </a:prstGeom>
+          <a:noFill/>
+          <a:ln>
+            <a:noFill/>
+          </a:ln>
+        </p:spPr>
+        <p:style>
+          <a:lnRef idx="0"/>
+          <a:fillRef idx="0"/>
+          <a:effectRef idx="0"/>
+          <a:fontRef idx="minor"/>
+        </p:style>
+        <p:txBody>
+          <a:bodyPr lIns="0" rIns="0" tIns="0" bIns="0" anchor="ctr"/>
+          <a:p>
+            <a:pPr algn="ctr">
+              <a:lnSpc>
+                <a:spcPct val="100000"/>
+              </a:lnSpc>
+            </a:pPr>
+            <a:r>
+              <a:rPr b="0" lang="en-IE" sz="4400" spc="-1" strike="noStrike">
+                <a:solidFill>
+                  <a:srgbClr val="ffffff"/>
+                </a:solidFill>
+                <a:latin typeface="Arial"/>
+                <a:ea typeface="DejaVu Sans"/>
+              </a:rPr>
+              <a:t>Introduction to Numpy</a:t>
+            </a:r>
+            <a:endParaRPr b="0" lang="en-IE" sz="4400" spc="-1" strike="noStrike">
+              <a:latin typeface="Arial"/>
+            </a:endParaRPr>
+          </a:p>
+        </p:txBody>
+      </p:sp>
+      <p:sp>
+        <p:nvSpPr>
+          <p:cNvPr id="160" name="CustomShape 2"/>
+          <p:cNvSpPr/>
+          <p:nvPr/>
+        </p:nvSpPr>
+        <p:spPr>
+          <a:xfrm>
+            <a:off x="504000" y="1769040"/>
+            <a:ext cx="9070560" cy="4383360"/>
+          </a:xfrm>
+          <a:prstGeom prst="rect">
+            <a:avLst/>
+          </a:prstGeom>
+          <a:noFill/>
+          <a:ln>
+            <a:noFill/>
+          </a:ln>
+        </p:spPr>
+        <p:style>
+          <a:lnRef idx="0"/>
+          <a:fillRef idx="0"/>
+          <a:effectRef idx="0"/>
+          <a:fontRef idx="minor"/>
+        </p:style>
+      </p:sp>
+      <p:graphicFrame>
+        <p:nvGraphicFramePr>
+          <p:cNvPr id="161" name="Table 3"/>
+          <p:cNvGraphicFramePr/>
+          <p:nvPr/>
+        </p:nvGraphicFramePr>
+        <p:xfrm>
+          <a:off x="338760" y="2523960"/>
+          <a:ext cx="9467280" cy="1844640"/>
+        </p:xfrm>
+        <a:graphic>
+          <a:graphicData uri="http://schemas.openxmlformats.org/drawingml/2006/table">
+            <a:tbl>
+              <a:tblPr/>
+              <a:tblGrid>
+                <a:gridCol w="9467640"/>
+              </a:tblGrid>
+              <a:tr h="1844640">
+                <a:tc>
+                  <a:txBody>
+                    <a:bodyPr lIns="90000" rIns="90000"/>
+                    <a:p>
+                      <a:pPr>
+                        <a:lnSpc>
+                          <a:spcPct val="100000"/>
+                        </a:lnSpc>
+                      </a:pPr>
+                      <a:r>
+                        <a:rPr b="0" lang="en-IE" sz="1800" spc="-1" strike="noStrike">
+                          <a:latin typeface="Courier New"/>
+                        </a:rPr>
+                        <a:t>import pandas as pd</a:t>
+                      </a:r>
+                      <a:endParaRPr b="0" lang="en-IE" sz="1800" spc="-1" strike="noStrike">
+                        <a:latin typeface="Arial"/>
+                      </a:endParaRPr>
+                    </a:p>
+                    <a:p>
+                      <a:pPr>
+                        <a:lnSpc>
+                          <a:spcPct val="100000"/>
+                        </a:lnSpc>
+                      </a:pPr>
+                      <a:r>
+                        <a:rPr b="0" lang="en-IE" sz="1800" spc="-1" strike="noStrike">
+                          <a:latin typeface="Courier New"/>
+                        </a:rPr>
+                        <a:t>data = [1,2,3,4,5]</a:t>
+                      </a:r>
+                      <a:endParaRPr b="0" lang="en-IE" sz="1800" spc="-1" strike="noStrike">
+                        <a:latin typeface="Arial"/>
+                      </a:endParaRPr>
+                    </a:p>
+                    <a:p>
+                      <a:pPr>
+                        <a:lnSpc>
+                          <a:spcPct val="100000"/>
+                        </a:lnSpc>
+                      </a:pPr>
+                      <a:r>
+                        <a:rPr b="0" lang="en-IE" sz="1800" spc="-1" strike="noStrike">
+                          <a:latin typeface="Courier New"/>
+                        </a:rPr>
+                        <a:t>df = pd.DataFrame(data)</a:t>
+                      </a:r>
+                      <a:endParaRPr b="0" lang="en-IE" sz="1800" spc="-1" strike="noStrike">
+                        <a:latin typeface="Arial"/>
+                      </a:endParaRPr>
+                    </a:p>
+                    <a:p>
+                      <a:pPr>
+                        <a:lnSpc>
+                          <a:spcPct val="100000"/>
+                        </a:lnSpc>
+                      </a:pPr>
+                      <a:r>
+                        <a:rPr b="0" lang="en-IE" sz="1800" spc="-1" strike="noStrike">
+                          <a:latin typeface="Courier New"/>
+                        </a:rPr>
+                        <a:t>print (df)</a:t>
+                      </a:r>
+                      <a:endParaRPr b="0" lang="en-IE" sz="1800" spc="-1" strike="noStrike">
+                        <a:latin typeface="Arial"/>
+                      </a:endParaRPr>
+                    </a:p>
+                    <a:p>
+                      <a:pPr>
+                        <a:lnSpc>
+                          <a:spcPct val="100000"/>
+                        </a:lnSpc>
+                      </a:pPr>
+                      <a:endParaRPr b="0" lang="en-IE" sz="1800" spc="-1" strike="noStrike">
+                        <a:latin typeface="Arial"/>
+                      </a:endParaRPr>
+                    </a:p>
+                    <a:p>
+                      <a:pPr>
+                        <a:lnSpc>
+                          <a:spcPct val="100000"/>
+                        </a:lnSpc>
+                      </a:pPr>
+                      <a:r>
+                        <a:rPr b="0" lang="en-IE" sz="1800" spc="-1" strike="noStrike">
+                          <a:latin typeface="Courier New"/>
+                        </a:rPr>
+                        <a:t>data = [['Alex',10],['Bob',12],['Clarke',13]]</a:t>
+                      </a:r>
+                      <a:endParaRPr b="0" lang="en-IE" sz="1800" spc="-1" strike="noStrike">
+                        <a:latin typeface="Arial"/>
+                      </a:endParaRPr>
+                    </a:p>
+                    <a:p>
+                      <a:pPr>
+                        <a:lnSpc>
+                          <a:spcPct val="100000"/>
+                        </a:lnSpc>
+                      </a:pPr>
+                      <a:r>
+                        <a:rPr b="0" lang="en-IE" sz="1800" spc="-1" strike="noStrike">
+                          <a:latin typeface="Courier New"/>
+                        </a:rPr>
+                        <a:t>df = pd.DataFrame(data,columns=['Name','Age'])</a:t>
+                      </a:r>
+                      <a:endParaRPr b="0" lang="en-IE" sz="1800" spc="-1" strike="noStrike">
+                        <a:latin typeface="Arial"/>
+                      </a:endParaRPr>
+                    </a:p>
+                    <a:p>
+                      <a:pPr>
+                        <a:lnSpc>
+                          <a:spcPct val="100000"/>
+                        </a:lnSpc>
+                      </a:pPr>
+                      <a:r>
+                        <a:rPr b="0" lang="en-IE" sz="1800" spc="-1" strike="noStrike">
+                          <a:latin typeface="Courier New"/>
+                        </a:rPr>
+                        <a:t>print (df)</a:t>
+                      </a:r>
+                      <a:endParaRPr b="0" lang="en-IE" sz="1800" spc="-1" strike="noStrike">
+                        <a:latin typeface="Arial"/>
+                      </a:endParaRPr>
+                    </a:p>
+                    <a:p>
+                      <a:pPr>
+                        <a:lnSpc>
+                          <a:spcPct val="100000"/>
+                        </a:lnSpc>
+                      </a:pPr>
+                      <a:endParaRPr b="0" lang="en-IE" sz="1800" spc="-1" strike="noStrike">
+                        <a:latin typeface="Arial"/>
+                      </a:endParaRPr>
+                    </a:p>
+                    <a:p>
+                      <a:pPr>
+                        <a:lnSpc>
+                          <a:spcPct val="100000"/>
+                        </a:lnSpc>
+                      </a:pPr>
+                      <a:r>
+                        <a:rPr b="0" lang="en-IE" sz="1800" spc="-1" strike="noStrike">
+                          <a:latin typeface="Courier New"/>
+                        </a:rPr>
+                        <a:t>data = [['Alex',10],['Bob',12],['Clarke',13]]</a:t>
+                      </a:r>
+                      <a:endParaRPr b="0" lang="en-IE" sz="1800" spc="-1" strike="noStrike">
+                        <a:latin typeface="Arial"/>
+                      </a:endParaRPr>
+                    </a:p>
+                    <a:p>
+                      <a:pPr>
+                        <a:lnSpc>
+                          <a:spcPct val="100000"/>
+                        </a:lnSpc>
+                      </a:pPr>
+                      <a:r>
+                        <a:rPr b="0" lang="en-IE" sz="1800" spc="-1" strike="noStrike">
+                          <a:latin typeface="Courier New"/>
+                        </a:rPr>
+                        <a:t>df = pd.DataFrame(data,columns=['Name','Age'],dtype=float)</a:t>
+                      </a:r>
+                      <a:endParaRPr b="0" lang="en-IE" sz="1800" spc="-1" strike="noStrike">
+                        <a:latin typeface="Arial"/>
+                      </a:endParaRPr>
+                    </a:p>
+                    <a:p>
+                      <a:pPr>
+                        <a:lnSpc>
+                          <a:spcPct val="100000"/>
+                        </a:lnSpc>
+                      </a:pPr>
+                      <a:r>
+                        <a:rPr b="0" lang="en-IE" sz="1800" spc="-1" strike="noStrike">
+                          <a:latin typeface="Courier New"/>
+                        </a:rPr>
+                        <a:t>print df</a:t>
+                      </a:r>
+                      <a:endParaRPr b="0" lang="en-IE" sz="1800" spc="-1" strike="noStrike">
+                        <a:latin typeface="Arial"/>
+                      </a:endParaRPr>
+                    </a:p>
+                  </a:txBody>
+                  <a:tcPr marL="90000" marR="90000">
+                    <a:lnL w="720">
+                      <a:solidFill>
+                        <a:srgbClr val="ffffff"/>
+                      </a:solidFill>
+                    </a:lnL>
+                    <a:lnR w="720">
+                      <a:solidFill>
+                        <a:srgbClr val="ffffff"/>
+                      </a:solidFill>
+                    </a:lnR>
+                    <a:lnT w="720">
+                      <a:solidFill>
+                        <a:srgbClr val="ffffff"/>
+                      </a:solidFill>
+                    </a:lnT>
+                    <a:lnB w="720">
+                      <a:solidFill>
+                        <a:srgbClr val="ffffff"/>
+                      </a:solidFill>
+                    </a:lnB>
+                    <a:solidFill>
+                      <a:srgbClr val="b3b3b3"/>
+                    </a:solidFill>
+                  </a:tcPr>
+                </a:tc>
+              </a:tr>
+            </a:tbl>
+          </a:graphicData>
+        </a:graphic>
+      </p:graphicFrame>
+    </p:spTree>
+  </p:cSld>
+  <p:timing>
+    <p:tnLst>
+      <p:par>
+        <p:cTn id="71" dur="indefinite" restart="never" nodeType="tmRoot">
+          <p:childTnLst>
+            <p:seq>
+              <p:cTn id="72" dur="indefinite" nodeType="mainSeq"/>
+              <p:prevCondLst>
+                <p:cond delay="0" evt="onPrev">
+                  <p:tgtEl>
+                    <p:sldTgt/>
+                  </p:tgtEl>
+                </p:cond>
+              </p:prevCondLst>
+              <p:nextCondLst>
+                <p:cond delay="0" evt="onNext">
+                  <p:tgtEl>
+                    <p:sldTgt/>
+                  </p:tgtEl>
+                </p:cond>
+              </p:nextCondLst>
+            </p:seq>
+          </p:childTnLst>
+        </p:cTn>
+      </p:par>
+    </p:tnLst>
+  </p:timing>
+</p:sld>
+</file>
+
+<file path=ppt/slides/slide37.xml><?xml version="1.0" encoding="utf-8"?>
+<p:sld xmlns:a="http://schemas.openxmlformats.org/drawingml/2006/main" xmlns:p="http://schemas.openxmlformats.org/presentationml/2006/main" xmlns:r="http://schemas.openxmlformats.org/officeDocument/2006/relationships" xmlns:p14="http://schemas.microsoft.com/office/powerpoint/2010/main" xmlns:p15="http://schemas.microsoft.com/office/powerpoint/2012/main" xmlns:mc="http://schemas.openxmlformats.org/markup-compatibility/2006">
+  <p:cSld>
+    <p:spTree>
+      <p:nvGrpSpPr>
+        <p:cNvPr id="1" name=""/>
+        <p:cNvGrpSpPr/>
+        <p:nvPr/>
+      </p:nvGrpSpPr>
+      <p:grpSpPr>
+        <a:xfrm>
+          <a:off x="0" y="0"/>
+          <a:ext cx="0" cy="0"/>
+          <a:chOff x="0" y="0"/>
+          <a:chExt cx="0" cy="0"/>
+        </a:xfrm>
+      </p:grpSpPr>
+      <p:sp>
+        <p:nvSpPr>
+          <p:cNvPr id="162" name="CustomShape 1"/>
+          <p:cNvSpPr/>
+          <p:nvPr/>
+        </p:nvSpPr>
+        <p:spPr>
+          <a:xfrm>
+            <a:off x="504000" y="301320"/>
+            <a:ext cx="9070560" cy="636480"/>
+          </a:xfrm>
+          <a:prstGeom prst="rect">
+            <a:avLst/>
+          </a:prstGeom>
+          <a:noFill/>
+          <a:ln>
+            <a:noFill/>
+          </a:ln>
+        </p:spPr>
+        <p:style>
+          <a:lnRef idx="0"/>
+          <a:fillRef idx="0"/>
+          <a:effectRef idx="0"/>
+          <a:fontRef idx="minor"/>
+        </p:style>
+        <p:txBody>
+          <a:bodyPr lIns="0" rIns="0" tIns="0" bIns="0" anchor="ctr"/>
+          <a:p>
+            <a:pPr algn="ctr">
+              <a:lnSpc>
+                <a:spcPct val="100000"/>
+              </a:lnSpc>
+            </a:pPr>
+            <a:r>
+              <a:rPr b="0" lang="en-IE" sz="4400" spc="-1" strike="noStrike">
+                <a:solidFill>
+                  <a:srgbClr val="ffffff"/>
+                </a:solidFill>
+                <a:latin typeface="Arial"/>
+                <a:ea typeface="DejaVu Sans"/>
+              </a:rPr>
+              <a:t>Introduction to Pandas</a:t>
+            </a:r>
+            <a:endParaRPr b="0" lang="en-IE" sz="4400" spc="-1" strike="noStrike">
+              <a:latin typeface="Arial"/>
+            </a:endParaRPr>
+          </a:p>
+        </p:txBody>
+      </p:sp>
+      <p:sp>
+        <p:nvSpPr>
+          <p:cNvPr id="163" name="CustomShape 2"/>
+          <p:cNvSpPr/>
+          <p:nvPr/>
+        </p:nvSpPr>
+        <p:spPr>
+          <a:xfrm>
+            <a:off x="504000" y="1769040"/>
+            <a:ext cx="9070560" cy="4383360"/>
+          </a:xfrm>
+          <a:prstGeom prst="rect">
+            <a:avLst/>
+          </a:prstGeom>
+          <a:noFill/>
+          <a:ln>
+            <a:noFill/>
+          </a:ln>
+        </p:spPr>
+        <p:style>
+          <a:lnRef idx="0"/>
+          <a:fillRef idx="0"/>
+          <a:effectRef idx="0"/>
+          <a:fontRef idx="minor"/>
+        </p:style>
+        <p:txBody>
+          <a:bodyPr lIns="0" rIns="0" tIns="0" bIns="0"/>
+          <a:p>
+            <a:pPr>
+              <a:lnSpc>
+                <a:spcPct val="100000"/>
+              </a:lnSpc>
+              <a:spcBef>
+                <a:spcPts val="1417"/>
+              </a:spcBef>
+            </a:pPr>
+            <a:endParaRPr b="0" lang="en-IE" sz="1800" spc="-1" strike="noStrike">
+              <a:latin typeface="Arial"/>
+            </a:endParaRPr>
+          </a:p>
+          <a:p>
+            <a:pPr marL="432000" indent="-322920">
+              <a:lnSpc>
+                <a:spcPct val="100000"/>
+              </a:lnSpc>
+              <a:spcBef>
+                <a:spcPts val="1417"/>
+              </a:spcBef>
+              <a:buClr>
+                <a:srgbClr val="000000"/>
+              </a:buClr>
+              <a:buSzPct val="45000"/>
+              <a:buFont typeface="Wingdings" charset="2"/>
+              <a:buChar char=""/>
+            </a:pPr>
+            <a:r>
+              <a:rPr b="0" lang="en-IE" sz="2800" spc="-1" strike="noStrike">
+                <a:solidFill>
+                  <a:srgbClr val="0066cc"/>
+                </a:solidFill>
+                <a:latin typeface="Arial"/>
+                <a:ea typeface="DejaVu Sans"/>
+              </a:rPr>
+              <a:t>Note that the first example creates a dataframe with one column.  The second one creates a dataframe with two columns.</a:t>
+            </a:r>
+            <a:endParaRPr b="0" lang="en-IE" sz="2800" spc="-1" strike="noStrike">
+              <a:latin typeface="Arial"/>
+            </a:endParaRPr>
+          </a:p>
+          <a:p>
+            <a:pPr marL="432000" indent="-322920">
+              <a:lnSpc>
+                <a:spcPct val="100000"/>
+              </a:lnSpc>
+              <a:spcBef>
+                <a:spcPts val="1417"/>
+              </a:spcBef>
+              <a:buClr>
+                <a:srgbClr val="000000"/>
+              </a:buClr>
+              <a:buSzPct val="45000"/>
+              <a:buFont typeface="Wingdings" charset="2"/>
+              <a:buChar char=""/>
+            </a:pPr>
+            <a:r>
+              <a:rPr b="0" lang="en-IE" sz="2800" spc="-1" strike="noStrike">
+                <a:solidFill>
+                  <a:srgbClr val="0066cc"/>
+                </a:solidFill>
+                <a:latin typeface="Arial"/>
+                <a:ea typeface="DejaVu Sans"/>
+              </a:rPr>
+              <a:t>The second example also shows how we can rename columns from the default numeric to a defined text value (In this case, name and age). </a:t>
+            </a:r>
+            <a:endParaRPr b="0" lang="en-IE" sz="2800" spc="-1" strike="noStrike">
+              <a:latin typeface="Arial"/>
+            </a:endParaRPr>
+          </a:p>
+          <a:p>
+            <a:pPr marL="432000" indent="-322920">
+              <a:lnSpc>
+                <a:spcPct val="100000"/>
+              </a:lnSpc>
+              <a:spcBef>
+                <a:spcPts val="1417"/>
+              </a:spcBef>
+              <a:buClr>
+                <a:srgbClr val="000000"/>
+              </a:buClr>
+              <a:buSzPct val="45000"/>
+              <a:buFont typeface="Wingdings" charset="2"/>
+              <a:buChar char=""/>
+            </a:pPr>
+            <a:r>
+              <a:rPr b="0" lang="en-IE" sz="2800" spc="-1" strike="noStrike">
+                <a:solidFill>
+                  <a:srgbClr val="0066cc"/>
+                </a:solidFill>
+                <a:latin typeface="Arial"/>
+                <a:ea typeface="DejaVu Sans"/>
+              </a:rPr>
+              <a:t>In the third example we set the data type of the age columns to be a floating point number. </a:t>
+            </a:r>
+            <a:endParaRPr b="0" lang="en-IE" sz="2800" spc="-1" strike="noStrike">
+              <a:latin typeface="Arial"/>
+            </a:endParaRPr>
+          </a:p>
+        </p:txBody>
+      </p:sp>
+    </p:spTree>
+  </p:cSld>
+  <p:timing>
+    <p:tnLst>
+      <p:par>
+        <p:cTn id="73" dur="indefinite" restart="never" nodeType="tmRoot">
+          <p:childTnLst>
+            <p:seq>
+              <p:cTn id="74" dur="indefinite" nodeType="mainSeq"/>
+              <p:prevCondLst>
+                <p:cond delay="0" evt="onPrev">
+                  <p:tgtEl>
+                    <p:sldTgt/>
+                  </p:tgtEl>
+                </p:cond>
+              </p:prevCondLst>
+              <p:nextCondLst>
+                <p:cond delay="0" evt="onNext">
+                  <p:tgtEl>
+                    <p:sldTgt/>
+                  </p:tgtEl>
+                </p:cond>
+              </p:nextCondLst>
+            </p:seq>
+          </p:childTnLst>
+        </p:cTn>
+      </p:par>
+    </p:tnLst>
+  </p:timing>
+</p:sld>
+</file>
+
+<file path=ppt/slides/slide38.xml><?xml version="1.0" encoding="utf-8"?>
+<p:sld xmlns:a="http://schemas.openxmlformats.org/drawingml/2006/main" xmlns:p="http://schemas.openxmlformats.org/presentationml/2006/main" xmlns:r="http://schemas.openxmlformats.org/officeDocument/2006/relationships" xmlns:p14="http://schemas.microsoft.com/office/powerpoint/2010/main" xmlns:p15="http://schemas.microsoft.com/office/powerpoint/2012/main" xmlns:mc="http://schemas.openxmlformats.org/markup-compatibility/2006">
+  <p:cSld>
+    <p:spTree>
+      <p:nvGrpSpPr>
+        <p:cNvPr id="1" name=""/>
+        <p:cNvGrpSpPr/>
+        <p:nvPr/>
+      </p:nvGrpSpPr>
+      <p:grpSpPr>
+        <a:xfrm>
+          <a:off x="0" y="0"/>
+          <a:ext cx="0" cy="0"/>
+          <a:chOff x="0" y="0"/>
+          <a:chExt cx="0" cy="0"/>
+        </a:xfrm>
+      </p:grpSpPr>
+      <p:sp>
+        <p:nvSpPr>
+          <p:cNvPr id="164" name="CustomShape 1"/>
+          <p:cNvSpPr/>
+          <p:nvPr/>
+        </p:nvSpPr>
+        <p:spPr>
+          <a:xfrm>
+            <a:off x="504000" y="301320"/>
+            <a:ext cx="9070560" cy="636480"/>
+          </a:xfrm>
+          <a:prstGeom prst="rect">
+            <a:avLst/>
+          </a:prstGeom>
+          <a:noFill/>
+          <a:ln>
+            <a:noFill/>
+          </a:ln>
+        </p:spPr>
+        <p:style>
+          <a:lnRef idx="0"/>
+          <a:fillRef idx="0"/>
+          <a:effectRef idx="0"/>
+          <a:fontRef idx="minor"/>
+        </p:style>
+        <p:txBody>
+          <a:bodyPr lIns="0" rIns="0" tIns="0" bIns="0" anchor="ctr"/>
+          <a:p>
+            <a:pPr algn="ctr">
+              <a:lnSpc>
+                <a:spcPct val="100000"/>
+              </a:lnSpc>
+            </a:pPr>
+            <a:r>
+              <a:rPr b="0" lang="en-IE" sz="4400" spc="-1" strike="noStrike">
+                <a:solidFill>
+                  <a:srgbClr val="ffffff"/>
+                </a:solidFill>
+                <a:latin typeface="Arial"/>
+                <a:ea typeface="DejaVu Sans"/>
+              </a:rPr>
+              <a:t>Introduction to Pandas</a:t>
+            </a:r>
+            <a:endParaRPr b="0" lang="en-IE" sz="4400" spc="-1" strike="noStrike">
+              <a:latin typeface="Arial"/>
+            </a:endParaRPr>
+          </a:p>
+        </p:txBody>
+      </p:sp>
+      <p:sp>
+        <p:nvSpPr>
+          <p:cNvPr id="165" name="CustomShape 2"/>
+          <p:cNvSpPr/>
+          <p:nvPr/>
+        </p:nvSpPr>
+        <p:spPr>
+          <a:xfrm>
+            <a:off x="504000" y="1769040"/>
+            <a:ext cx="9070560" cy="4383360"/>
+          </a:xfrm>
+          <a:prstGeom prst="rect">
+            <a:avLst/>
+          </a:prstGeom>
+          <a:noFill/>
+          <a:ln>
+            <a:noFill/>
+          </a:ln>
+        </p:spPr>
+        <p:style>
+          <a:lnRef idx="0"/>
+          <a:fillRef idx="0"/>
+          <a:effectRef idx="0"/>
+          <a:fontRef idx="minor"/>
+        </p:style>
+        <p:txBody>
+          <a:bodyPr lIns="0" rIns="0" tIns="0" bIns="0"/>
+          <a:p>
+            <a:pPr>
+              <a:lnSpc>
+                <a:spcPct val="100000"/>
+              </a:lnSpc>
+              <a:spcBef>
+                <a:spcPts val="1417"/>
+              </a:spcBef>
+            </a:pPr>
+            <a:endParaRPr b="0" lang="en-IE" sz="1800" spc="-1" strike="noStrike">
+              <a:latin typeface="Arial"/>
+            </a:endParaRPr>
+          </a:p>
+          <a:p>
+            <a:pPr marL="432000" indent="-322920">
+              <a:lnSpc>
+                <a:spcPct val="100000"/>
+              </a:lnSpc>
+              <a:spcBef>
+                <a:spcPts val="1417"/>
+              </a:spcBef>
+              <a:buClr>
+                <a:srgbClr val="000000"/>
+              </a:buClr>
+              <a:buSzPct val="45000"/>
+              <a:buFont typeface="Wingdings" charset="2"/>
+              <a:buChar char=""/>
+            </a:pPr>
+            <a:r>
+              <a:rPr b="0" lang="en-IE" sz="2800" spc="-1" strike="noStrike">
+                <a:solidFill>
+                  <a:srgbClr val="0066cc"/>
+                </a:solidFill>
+                <a:latin typeface="Arial"/>
+                <a:ea typeface="DejaVu Sans"/>
+              </a:rPr>
+              <a:t>We can access individual columns or groups of columns in a dataframe by using the [ ] operator.</a:t>
+            </a:r>
+            <a:endParaRPr b="0" lang="en-IE" sz="2800" spc="-1" strike="noStrike">
+              <a:latin typeface="Arial"/>
+            </a:endParaRPr>
+          </a:p>
+          <a:p>
+            <a:pPr marL="432000" indent="-322920">
+              <a:lnSpc>
+                <a:spcPct val="100000"/>
+              </a:lnSpc>
+              <a:spcBef>
+                <a:spcPts val="1417"/>
+              </a:spcBef>
+              <a:buClr>
+                <a:srgbClr val="000000"/>
+              </a:buClr>
+              <a:buSzPct val="45000"/>
+              <a:buFont typeface="Wingdings" charset="2"/>
+              <a:buChar char=""/>
+            </a:pPr>
+            <a:r>
+              <a:rPr b="0" lang="en-IE" sz="2800" spc="-1" strike="noStrike">
+                <a:solidFill>
+                  <a:srgbClr val="0066cc"/>
+                </a:solidFill>
+                <a:latin typeface="Arial"/>
+                <a:ea typeface="DejaVu Sans"/>
+              </a:rPr>
+              <a:t>We can set the row index by using the index parameter to the DataFrame creation method</a:t>
+            </a:r>
+            <a:endParaRPr b="0" lang="en-IE" sz="2800" spc="-1" strike="noStrike">
+              <a:latin typeface="Arial"/>
+            </a:endParaRPr>
+          </a:p>
+          <a:p>
+            <a:pPr marL="432000" indent="-322920">
+              <a:lnSpc>
+                <a:spcPct val="100000"/>
+              </a:lnSpc>
+              <a:spcBef>
+                <a:spcPts val="1417"/>
+              </a:spcBef>
+              <a:buClr>
+                <a:srgbClr val="000000"/>
+              </a:buClr>
+              <a:buSzPct val="45000"/>
+              <a:buFont typeface="Wingdings" charset="2"/>
+              <a:buChar char=""/>
+            </a:pPr>
+            <a:r>
+              <a:rPr b="0" lang="en-IE" sz="2800" spc="-1" strike="noStrike">
+                <a:solidFill>
+                  <a:srgbClr val="0066cc"/>
+                </a:solidFill>
+                <a:latin typeface="Arial"/>
+                <a:ea typeface="DejaVu Sans"/>
+              </a:rPr>
+              <a:t>We can set the column index by using the columns parameter to the DataFrame creation method. </a:t>
+            </a:r>
+            <a:endParaRPr b="0" lang="en-IE" sz="2800" spc="-1" strike="noStrike">
+              <a:latin typeface="Arial"/>
+            </a:endParaRPr>
+          </a:p>
+          <a:p>
+            <a:pPr marL="432000" indent="-322920">
+              <a:lnSpc>
+                <a:spcPct val="100000"/>
+              </a:lnSpc>
+              <a:spcBef>
+                <a:spcPts val="1417"/>
+              </a:spcBef>
+              <a:buClr>
+                <a:srgbClr val="000000"/>
+              </a:buClr>
+              <a:buSzPct val="45000"/>
+              <a:buFont typeface="Wingdings" charset="2"/>
+              <a:buChar char=""/>
+            </a:pPr>
+            <a:r>
+              <a:rPr b="0" lang="en-IE" sz="2800" spc="-1" strike="noStrike">
+                <a:solidFill>
+                  <a:srgbClr val="0066cc"/>
+                </a:solidFill>
+                <a:latin typeface="Arial"/>
+                <a:ea typeface="DejaVu Sans"/>
+              </a:rPr>
+              <a:t>We can pass the column index value to the [ ] operator to get individual columns or slices of columns. </a:t>
+            </a:r>
+            <a:endParaRPr b="0" lang="en-IE" sz="2800" spc="-1" strike="noStrike">
+              <a:latin typeface="Arial"/>
+            </a:endParaRPr>
+          </a:p>
+          <a:p>
+            <a:pPr marL="432000" indent="-322920">
+              <a:lnSpc>
+                <a:spcPct val="100000"/>
+              </a:lnSpc>
+              <a:spcBef>
+                <a:spcPts val="1417"/>
+              </a:spcBef>
+              <a:buClr>
+                <a:srgbClr val="000000"/>
+              </a:buClr>
+              <a:buSzPct val="45000"/>
+              <a:buFont typeface="Wingdings" charset="2"/>
+              <a:buChar char=""/>
+            </a:pPr>
+            <a:endParaRPr b="0" lang="en-IE" sz="2800" spc="-1" strike="noStrike">
+              <a:latin typeface="Arial"/>
+            </a:endParaRPr>
+          </a:p>
+        </p:txBody>
+      </p:sp>
+    </p:spTree>
+  </p:cSld>
+  <p:timing>
+    <p:tnLst>
+      <p:par>
+        <p:cTn id="75" dur="indefinite" restart="never" nodeType="tmRoot">
+          <p:childTnLst>
+            <p:seq>
+              <p:cTn id="76" dur="indefinite" nodeType="mainSeq"/>
+              <p:prevCondLst>
+                <p:cond delay="0" evt="onPrev">
+                  <p:tgtEl>
+                    <p:sldTgt/>
+                  </p:tgtEl>
+                </p:cond>
+              </p:prevCondLst>
+              <p:nextCondLst>
+                <p:cond delay="0" evt="onNext">
+                  <p:tgtEl>
+                    <p:sldTgt/>
+                  </p:tgtEl>
+                </p:cond>
+              </p:nextCondLst>
+            </p:seq>
+          </p:childTnLst>
+        </p:cTn>
+      </p:par>
+    </p:tnLst>
+  </p:timing>
+</p:sld>
+</file>
+
+<file path=ppt/slides/slide39.xml><?xml version="1.0" encoding="utf-8"?>
+<p:sld xmlns:a="http://schemas.openxmlformats.org/drawingml/2006/main" xmlns:p="http://schemas.openxmlformats.org/presentationml/2006/main" xmlns:r="http://schemas.openxmlformats.org/officeDocument/2006/relationships" xmlns:p14="http://schemas.microsoft.com/office/powerpoint/2010/main" xmlns:p15="http://schemas.microsoft.com/office/powerpoint/2012/main" xmlns:mc="http://schemas.openxmlformats.org/markup-compatibility/2006">
+  <p:cSld>
+    <p:spTree>
+      <p:nvGrpSpPr>
+        <p:cNvPr id="1" name=""/>
+        <p:cNvGrpSpPr/>
+        <p:nvPr/>
+      </p:nvGrpSpPr>
+      <p:grpSpPr>
+        <a:xfrm>
+          <a:off x="0" y="0"/>
+          <a:ext cx="0" cy="0"/>
+          <a:chOff x="0" y="0"/>
+          <a:chExt cx="0" cy="0"/>
+        </a:xfrm>
+      </p:grpSpPr>
+      <p:sp>
+        <p:nvSpPr>
+          <p:cNvPr id="166" name="CustomShape 1"/>
+          <p:cNvSpPr/>
+          <p:nvPr/>
+        </p:nvSpPr>
+        <p:spPr>
+          <a:xfrm>
+            <a:off x="504000" y="301320"/>
+            <a:ext cx="9070560" cy="636480"/>
+          </a:xfrm>
+          <a:prstGeom prst="rect">
+            <a:avLst/>
+          </a:prstGeom>
+          <a:noFill/>
+          <a:ln>
+            <a:noFill/>
+          </a:ln>
+        </p:spPr>
+        <p:style>
+          <a:lnRef idx="0"/>
+          <a:fillRef idx="0"/>
+          <a:effectRef idx="0"/>
+          <a:fontRef idx="minor"/>
+        </p:style>
+        <p:txBody>
+          <a:bodyPr lIns="0" rIns="0" tIns="0" bIns="0" anchor="ctr"/>
+          <a:p>
+            <a:pPr algn="ctr">
+              <a:lnSpc>
+                <a:spcPct val="100000"/>
+              </a:lnSpc>
+            </a:pPr>
+            <a:r>
+              <a:rPr b="0" lang="en-IE" sz="4400" spc="-1" strike="noStrike">
+                <a:solidFill>
+                  <a:srgbClr val="ffffff"/>
+                </a:solidFill>
+                <a:latin typeface="Arial"/>
+                <a:ea typeface="DejaVu Sans"/>
+              </a:rPr>
+              <a:t>Introduction to Pandas</a:t>
+            </a:r>
+            <a:endParaRPr b="0" lang="en-IE" sz="4400" spc="-1" strike="noStrike">
+              <a:latin typeface="Arial"/>
+            </a:endParaRPr>
+          </a:p>
+        </p:txBody>
+      </p:sp>
+      <p:sp>
+        <p:nvSpPr>
+          <p:cNvPr id="167" name="CustomShape 2"/>
+          <p:cNvSpPr/>
+          <p:nvPr/>
+        </p:nvSpPr>
+        <p:spPr>
+          <a:xfrm>
+            <a:off x="504000" y="1769040"/>
+            <a:ext cx="9070560" cy="4383360"/>
+          </a:xfrm>
+          <a:prstGeom prst="rect">
+            <a:avLst/>
+          </a:prstGeom>
+          <a:noFill/>
+          <a:ln>
+            <a:noFill/>
+          </a:ln>
+        </p:spPr>
+        <p:style>
+          <a:lnRef idx="0"/>
+          <a:fillRef idx="0"/>
+          <a:effectRef idx="0"/>
+          <a:fontRef idx="minor"/>
+        </p:style>
+        <p:txBody>
+          <a:bodyPr lIns="0" rIns="0" tIns="0" bIns="0"/>
+          <a:p>
+            <a:pPr>
+              <a:lnSpc>
+                <a:spcPct val="100000"/>
+              </a:lnSpc>
+              <a:spcBef>
+                <a:spcPts val="1417"/>
+              </a:spcBef>
+            </a:pPr>
+            <a:endParaRPr b="0" lang="en-IE" sz="1800" spc="-1" strike="noStrike">
+              <a:latin typeface="Arial"/>
+            </a:endParaRPr>
+          </a:p>
+          <a:p>
+            <a:pPr marL="432000" indent="-322920">
+              <a:lnSpc>
+                <a:spcPct val="100000"/>
+              </a:lnSpc>
+              <a:spcBef>
+                <a:spcPts val="1417"/>
+              </a:spcBef>
+              <a:buClr>
+                <a:srgbClr val="000000"/>
+              </a:buClr>
+              <a:buSzPct val="45000"/>
+              <a:buFont typeface="Wingdings" charset="2"/>
+              <a:buChar char=""/>
+            </a:pPr>
+            <a:r>
+              <a:rPr b="0" lang="en-IE" sz="2800" spc="-1" strike="noStrike">
+                <a:solidFill>
+                  <a:srgbClr val="0066cc"/>
+                </a:solidFill>
+                <a:latin typeface="Arial"/>
+                <a:ea typeface="DejaVu Sans"/>
+              </a:rPr>
+              <a:t>Following is an example of setting row and column indices in pandas.  </a:t>
+            </a:r>
+            <a:endParaRPr b="0" lang="en-IE" sz="2800" spc="-1" strike="noStrike">
+              <a:latin typeface="Arial"/>
+            </a:endParaRPr>
+          </a:p>
+        </p:txBody>
+      </p:sp>
+    </p:spTree>
+  </p:cSld>
+  <p:timing>
+    <p:tnLst>
+      <p:par>
+        <p:cTn id="77" dur="indefinite" restart="never" nodeType="tmRoot">
+          <p:childTnLst>
+            <p:seq>
+              <p:cTn id="78" dur="indefinite" nodeType="mainSeq"/>
               <p:prevCondLst>
                 <p:cond delay="0" evt="onPrev">
                   <p:tgtEl>
@@ -11350,6 +12648,2067 @@
           <p:childTnLst>
             <p:seq>
               <p:cTn id="8" dur="indefinite" nodeType="mainSeq"/>
+              <p:prevCondLst>
+                <p:cond delay="0" evt="onPrev">
+                  <p:tgtEl>
+                    <p:sldTgt/>
+                  </p:tgtEl>
+                </p:cond>
+              </p:prevCondLst>
+              <p:nextCondLst>
+                <p:cond delay="0" evt="onNext">
+                  <p:tgtEl>
+                    <p:sldTgt/>
+                  </p:tgtEl>
+                </p:cond>
+              </p:nextCondLst>
+            </p:seq>
+          </p:childTnLst>
+        </p:cTn>
+      </p:par>
+    </p:tnLst>
+  </p:timing>
+</p:sld>
+</file>
+
+<file path=ppt/slides/slide40.xml><?xml version="1.0" encoding="utf-8"?>
+<p:sld xmlns:a="http://schemas.openxmlformats.org/drawingml/2006/main" xmlns:p="http://schemas.openxmlformats.org/presentationml/2006/main" xmlns:r="http://schemas.openxmlformats.org/officeDocument/2006/relationships" xmlns:p14="http://schemas.microsoft.com/office/powerpoint/2010/main" xmlns:p15="http://schemas.microsoft.com/office/powerpoint/2012/main" xmlns:mc="http://schemas.openxmlformats.org/markup-compatibility/2006">
+  <p:cSld>
+    <p:spTree>
+      <p:nvGrpSpPr>
+        <p:cNvPr id="1" name=""/>
+        <p:cNvGrpSpPr/>
+        <p:nvPr/>
+      </p:nvGrpSpPr>
+      <p:grpSpPr>
+        <a:xfrm>
+          <a:off x="0" y="0"/>
+          <a:ext cx="0" cy="0"/>
+          <a:chOff x="0" y="0"/>
+          <a:chExt cx="0" cy="0"/>
+        </a:xfrm>
+      </p:grpSpPr>
+      <p:sp>
+        <p:nvSpPr>
+          <p:cNvPr id="168" name="CustomShape 1"/>
+          <p:cNvSpPr/>
+          <p:nvPr/>
+        </p:nvSpPr>
+        <p:spPr>
+          <a:xfrm>
+            <a:off x="504000" y="301320"/>
+            <a:ext cx="9070560" cy="636480"/>
+          </a:xfrm>
+          <a:prstGeom prst="rect">
+            <a:avLst/>
+          </a:prstGeom>
+          <a:noFill/>
+          <a:ln>
+            <a:noFill/>
+          </a:ln>
+        </p:spPr>
+        <p:style>
+          <a:lnRef idx="0"/>
+          <a:fillRef idx="0"/>
+          <a:effectRef idx="0"/>
+          <a:fontRef idx="minor"/>
+        </p:style>
+        <p:txBody>
+          <a:bodyPr lIns="0" rIns="0" tIns="0" bIns="0" anchor="ctr"/>
+          <a:p>
+            <a:pPr algn="ctr">
+              <a:lnSpc>
+                <a:spcPct val="100000"/>
+              </a:lnSpc>
+            </a:pPr>
+            <a:r>
+              <a:rPr b="0" lang="en-IE" sz="4400" spc="-1" strike="noStrike">
+                <a:solidFill>
+                  <a:srgbClr val="ffffff"/>
+                </a:solidFill>
+                <a:latin typeface="Arial"/>
+                <a:ea typeface="DejaVu Sans"/>
+              </a:rPr>
+              <a:t>Introduction to Numpy</a:t>
+            </a:r>
+            <a:endParaRPr b="0" lang="en-IE" sz="4400" spc="-1" strike="noStrike">
+              <a:latin typeface="Arial"/>
+            </a:endParaRPr>
+          </a:p>
+        </p:txBody>
+      </p:sp>
+      <p:sp>
+        <p:nvSpPr>
+          <p:cNvPr id="169" name="CustomShape 2"/>
+          <p:cNvSpPr/>
+          <p:nvPr/>
+        </p:nvSpPr>
+        <p:spPr>
+          <a:xfrm>
+            <a:off x="504000" y="1769040"/>
+            <a:ext cx="9070560" cy="4383360"/>
+          </a:xfrm>
+          <a:prstGeom prst="rect">
+            <a:avLst/>
+          </a:prstGeom>
+          <a:noFill/>
+          <a:ln>
+            <a:noFill/>
+          </a:ln>
+        </p:spPr>
+        <p:style>
+          <a:lnRef idx="0"/>
+          <a:fillRef idx="0"/>
+          <a:effectRef idx="0"/>
+          <a:fontRef idx="minor"/>
+        </p:style>
+      </p:sp>
+      <p:graphicFrame>
+        <p:nvGraphicFramePr>
+          <p:cNvPr id="170" name="Table 3"/>
+          <p:cNvGraphicFramePr/>
+          <p:nvPr/>
+        </p:nvGraphicFramePr>
+        <p:xfrm>
+          <a:off x="315720" y="1547640"/>
+          <a:ext cx="9467280" cy="1844640"/>
+        </p:xfrm>
+        <a:graphic>
+          <a:graphicData uri="http://schemas.openxmlformats.org/drawingml/2006/table">
+            <a:tbl>
+              <a:tblPr/>
+              <a:tblGrid>
+                <a:gridCol w="9467640"/>
+              </a:tblGrid>
+              <a:tr h="3979800">
+                <a:tc>
+                  <a:txBody>
+                    <a:bodyPr lIns="90000" rIns="90000"/>
+                    <a:p>
+                      <a:pPr>
+                        <a:lnSpc>
+                          <a:spcPct val="100000"/>
+                        </a:lnSpc>
+                      </a:pPr>
+                      <a:r>
+                        <a:rPr b="0" lang="en-IE" sz="1800" spc="-1" strike="noStrike">
+                          <a:latin typeface="Courier New"/>
+                        </a:rPr>
+                        <a:t>import pandas as pd</a:t>
+                      </a:r>
+                      <a:endParaRPr b="0" lang="en-IE" sz="1800" spc="-1" strike="noStrike">
+                        <a:latin typeface="Arial"/>
+                      </a:endParaRPr>
+                    </a:p>
+                    <a:p>
+                      <a:pPr>
+                        <a:lnSpc>
+                          <a:spcPct val="100000"/>
+                        </a:lnSpc>
+                      </a:pPr>
+                      <a:r>
+                        <a:rPr b="0" lang="en-IE" sz="1800" spc="-1" strike="noStrike">
+                          <a:latin typeface="Courier New"/>
+                        </a:rPr>
+                        <a:t>import numpy as np</a:t>
+                      </a:r>
+                      <a:endParaRPr b="0" lang="en-IE" sz="1800" spc="-1" strike="noStrike">
+                        <a:latin typeface="Arial"/>
+                      </a:endParaRPr>
+                    </a:p>
+                    <a:p>
+                      <a:pPr>
+                        <a:lnSpc>
+                          <a:spcPct val="100000"/>
+                        </a:lnSpc>
+                      </a:pPr>
+                      <a:r>
+                        <a:rPr b="0" lang="en-IE" sz="1800" spc="-1" strike="noStrike">
+                          <a:latin typeface="Courier New"/>
+                        </a:rPr>
+                        <a:t>data = np.array([['12345','Braun',21],['12346','David',22],['12347','Pat',23]])</a:t>
+                      </a:r>
+                      <a:endParaRPr b="0" lang="en-IE" sz="1800" spc="-1" strike="noStrike">
+                        <a:latin typeface="Arial"/>
+                      </a:endParaRPr>
+                    </a:p>
+                    <a:p>
+                      <a:pPr>
+                        <a:lnSpc>
+                          <a:spcPct val="100000"/>
+                        </a:lnSpc>
+                      </a:pPr>
+                      <a:r>
+                        <a:rPr b="0" lang="en-IE" sz="1800" spc="-1" strike="noStrike">
+                          <a:latin typeface="Courier New"/>
+                        </a:rPr>
+                        <a:t>df = pd.DataFrame(data[:,1:3],index=data[:,0],columns=['Name','Age'])</a:t>
+                      </a:r>
+                      <a:endParaRPr b="0" lang="en-IE" sz="1800" spc="-1" strike="noStrike">
+                        <a:latin typeface="Arial"/>
+                      </a:endParaRPr>
+                    </a:p>
+                    <a:p>
+                      <a:pPr>
+                        <a:lnSpc>
+                          <a:spcPct val="100000"/>
+                        </a:lnSpc>
+                      </a:pPr>
+                      <a:r>
+                        <a:rPr b="0" lang="en-IE" sz="1800" spc="-1" strike="noStrike">
+                          <a:latin typeface="Courier New"/>
+                        </a:rPr>
+                        <a:t>print (df)</a:t>
+                      </a:r>
+                      <a:endParaRPr b="0" lang="en-IE" sz="1800" spc="-1" strike="noStrike">
+                        <a:latin typeface="Arial"/>
+                      </a:endParaRPr>
+                    </a:p>
+                    <a:p>
+                      <a:pPr>
+                        <a:lnSpc>
+                          <a:spcPct val="100000"/>
+                        </a:lnSpc>
+                      </a:pPr>
+                      <a:r>
+                        <a:rPr b="0" lang="en-IE" sz="1800" spc="-1" strike="noStrike">
+                          <a:latin typeface="Courier New"/>
+                        </a:rPr>
+                        <a:t>Print (df.ix[:]) # Prints all rows</a:t>
+                      </a:r>
+                      <a:endParaRPr b="0" lang="en-IE" sz="1800" spc="-1" strike="noStrike">
+                        <a:latin typeface="Arial"/>
+                      </a:endParaRPr>
+                    </a:p>
+                    <a:p>
+                      <a:pPr>
+                        <a:lnSpc>
+                          <a:spcPct val="100000"/>
+                        </a:lnSpc>
+                      </a:pPr>
+                      <a:r>
+                        <a:rPr b="0" lang="en-IE" sz="1800" spc="-1" strike="noStrike">
+                          <a:latin typeface="Courier New"/>
+                        </a:rPr>
+                        <a:t>print (df.loc[[‘12345’]]) # Prints just the row with ID 12345</a:t>
+                      </a:r>
+                      <a:endParaRPr b="0" lang="en-IE" sz="1800" spc="-1" strike="noStrike">
+                        <a:latin typeface="Arial"/>
+                      </a:endParaRPr>
+                    </a:p>
+                    <a:p>
+                      <a:pPr>
+                        <a:lnSpc>
+                          <a:spcPct val="100000"/>
+                        </a:lnSpc>
+                      </a:pPr>
+                      <a:r>
+                        <a:rPr b="0" lang="en-IE" sz="1800" spc="-1" strike="noStrike">
+                          <a:latin typeface="Courier New"/>
+                        </a:rPr>
+                        <a:t>print (df.loc([[‘12345’],[‘12346’]]) # Prints the rows with ID 12345 and 12346</a:t>
+                      </a:r>
+                      <a:endParaRPr b="0" lang="en-IE" sz="1800" spc="-1" strike="noStrike">
+                        <a:latin typeface="Arial"/>
+                      </a:endParaRPr>
+                    </a:p>
+                    <a:p>
+                      <a:pPr>
+                        <a:lnSpc>
+                          <a:spcPct val="100000"/>
+                        </a:lnSpc>
+                      </a:pPr>
+                      <a:r>
+                        <a:rPr b="0" lang="en-IE" sz="1800" spc="-1" strike="noStrike">
+                          <a:latin typeface="Courier New"/>
+                        </a:rPr>
+                        <a:t>Print df[‘Name’] # Prints the first column of all rows</a:t>
+                      </a:r>
+                      <a:endParaRPr b="0" lang="en-IE" sz="1800" spc="-1" strike="noStrike">
+                        <a:latin typeface="Arial"/>
+                      </a:endParaRPr>
+                    </a:p>
+                    <a:p>
+                      <a:pPr>
+                        <a:lnSpc>
+                          <a:spcPct val="100000"/>
+                        </a:lnSpc>
+                      </a:pPr>
+                      <a:r>
+                        <a:rPr b="0" lang="en-IE" sz="1800" spc="-1" strike="noStrike">
+                          <a:latin typeface="Courier New"/>
+                        </a:rPr>
+                        <a:t>Print (df.loc[‘12345’:’12346’,’Name’]) # Print the first column of the first two rows of data</a:t>
+                      </a:r>
+                      <a:endParaRPr b="0" lang="en-IE" sz="1800" spc="-1" strike="noStrike">
+                        <a:latin typeface="Arial"/>
+                      </a:endParaRPr>
+                    </a:p>
+                    <a:p>
+                      <a:pPr>
+                        <a:lnSpc>
+                          <a:spcPct val="100000"/>
+                        </a:lnSpc>
+                      </a:pPr>
+                      <a:endParaRPr b="0" lang="en-IE" sz="1800" spc="-1" strike="noStrike">
+                        <a:latin typeface="Arial"/>
+                      </a:endParaRPr>
+                    </a:p>
+                  </a:txBody>
+                  <a:tcPr marL="90000" marR="90000">
+                    <a:lnL w="720">
+                      <a:solidFill>
+                        <a:srgbClr val="ffffff"/>
+                      </a:solidFill>
+                    </a:lnL>
+                    <a:lnR w="720">
+                      <a:solidFill>
+                        <a:srgbClr val="ffffff"/>
+                      </a:solidFill>
+                    </a:lnR>
+                    <a:lnT w="720">
+                      <a:solidFill>
+                        <a:srgbClr val="ffffff"/>
+                      </a:solidFill>
+                    </a:lnT>
+                    <a:lnB w="720">
+                      <a:solidFill>
+                        <a:srgbClr val="ffffff"/>
+                      </a:solidFill>
+                    </a:lnB>
+                    <a:solidFill>
+                      <a:srgbClr val="b3b3b3"/>
+                    </a:solidFill>
+                  </a:tcPr>
+                </a:tc>
+              </a:tr>
+            </a:tbl>
+          </a:graphicData>
+        </a:graphic>
+      </p:graphicFrame>
+    </p:spTree>
+  </p:cSld>
+  <p:timing>
+    <p:tnLst>
+      <p:par>
+        <p:cTn id="79" dur="indefinite" restart="never" nodeType="tmRoot">
+          <p:childTnLst>
+            <p:seq>
+              <p:cTn id="80" dur="indefinite" nodeType="mainSeq"/>
+              <p:prevCondLst>
+                <p:cond delay="0" evt="onPrev">
+                  <p:tgtEl>
+                    <p:sldTgt/>
+                  </p:tgtEl>
+                </p:cond>
+              </p:prevCondLst>
+              <p:nextCondLst>
+                <p:cond delay="0" evt="onNext">
+                  <p:tgtEl>
+                    <p:sldTgt/>
+                  </p:tgtEl>
+                </p:cond>
+              </p:nextCondLst>
+            </p:seq>
+          </p:childTnLst>
+        </p:cTn>
+      </p:par>
+    </p:tnLst>
+  </p:timing>
+</p:sld>
+</file>
+
+<file path=ppt/slides/slide41.xml><?xml version="1.0" encoding="utf-8"?>
+<p:sld xmlns:a="http://schemas.openxmlformats.org/drawingml/2006/main" xmlns:p="http://schemas.openxmlformats.org/presentationml/2006/main" xmlns:r="http://schemas.openxmlformats.org/officeDocument/2006/relationships" xmlns:p14="http://schemas.microsoft.com/office/powerpoint/2010/main" xmlns:p15="http://schemas.microsoft.com/office/powerpoint/2012/main" xmlns:mc="http://schemas.openxmlformats.org/markup-compatibility/2006">
+  <p:cSld>
+    <p:spTree>
+      <p:nvGrpSpPr>
+        <p:cNvPr id="1" name=""/>
+        <p:cNvGrpSpPr/>
+        <p:nvPr/>
+      </p:nvGrpSpPr>
+      <p:grpSpPr>
+        <a:xfrm>
+          <a:off x="0" y="0"/>
+          <a:ext cx="0" cy="0"/>
+          <a:chOff x="0" y="0"/>
+          <a:chExt cx="0" cy="0"/>
+        </a:xfrm>
+      </p:grpSpPr>
+      <p:sp>
+        <p:nvSpPr>
+          <p:cNvPr id="171" name="CustomShape 1"/>
+          <p:cNvSpPr/>
+          <p:nvPr/>
+        </p:nvSpPr>
+        <p:spPr>
+          <a:xfrm>
+            <a:off x="504000" y="301320"/>
+            <a:ext cx="9070560" cy="636480"/>
+          </a:xfrm>
+          <a:prstGeom prst="rect">
+            <a:avLst/>
+          </a:prstGeom>
+          <a:noFill/>
+          <a:ln>
+            <a:noFill/>
+          </a:ln>
+        </p:spPr>
+        <p:style>
+          <a:lnRef idx="0"/>
+          <a:fillRef idx="0"/>
+          <a:effectRef idx="0"/>
+          <a:fontRef idx="minor"/>
+        </p:style>
+        <p:txBody>
+          <a:bodyPr lIns="0" rIns="0" tIns="0" bIns="0" anchor="ctr"/>
+          <a:p>
+            <a:pPr algn="ctr">
+              <a:lnSpc>
+                <a:spcPct val="100000"/>
+              </a:lnSpc>
+            </a:pPr>
+            <a:r>
+              <a:rPr b="0" lang="en-IE" sz="4400" spc="-1" strike="noStrike">
+                <a:solidFill>
+                  <a:srgbClr val="ffffff"/>
+                </a:solidFill>
+                <a:latin typeface="Arial"/>
+                <a:ea typeface="DejaVu Sans"/>
+              </a:rPr>
+              <a:t>Introduction to Pandas</a:t>
+            </a:r>
+            <a:endParaRPr b="0" lang="en-IE" sz="4400" spc="-1" strike="noStrike">
+              <a:latin typeface="Arial"/>
+            </a:endParaRPr>
+          </a:p>
+        </p:txBody>
+      </p:sp>
+      <p:sp>
+        <p:nvSpPr>
+          <p:cNvPr id="172" name="CustomShape 2"/>
+          <p:cNvSpPr/>
+          <p:nvPr/>
+        </p:nvSpPr>
+        <p:spPr>
+          <a:xfrm>
+            <a:off x="504000" y="1769040"/>
+            <a:ext cx="9070560" cy="4383360"/>
+          </a:xfrm>
+          <a:prstGeom prst="rect">
+            <a:avLst/>
+          </a:prstGeom>
+          <a:noFill/>
+          <a:ln>
+            <a:noFill/>
+          </a:ln>
+        </p:spPr>
+        <p:style>
+          <a:lnRef idx="0"/>
+          <a:fillRef idx="0"/>
+          <a:effectRef idx="0"/>
+          <a:fontRef idx="minor"/>
+        </p:style>
+        <p:txBody>
+          <a:bodyPr lIns="0" rIns="0" tIns="0" bIns="0"/>
+          <a:p>
+            <a:pPr>
+              <a:lnSpc>
+                <a:spcPct val="100000"/>
+              </a:lnSpc>
+              <a:spcBef>
+                <a:spcPts val="1417"/>
+              </a:spcBef>
+            </a:pPr>
+            <a:endParaRPr b="0" lang="en-IE" sz="1800" spc="-1" strike="noStrike">
+              <a:latin typeface="Arial"/>
+            </a:endParaRPr>
+          </a:p>
+          <a:p>
+            <a:pPr marL="432000" indent="-322920">
+              <a:lnSpc>
+                <a:spcPct val="100000"/>
+              </a:lnSpc>
+              <a:spcBef>
+                <a:spcPts val="1417"/>
+              </a:spcBef>
+              <a:buClr>
+                <a:srgbClr val="000000"/>
+              </a:buClr>
+              <a:buSzPct val="45000"/>
+              <a:buFont typeface="Wingdings" charset="2"/>
+              <a:buChar char=""/>
+            </a:pPr>
+            <a:r>
+              <a:rPr b="0" lang="en-IE" sz="2800" spc="-1" strike="noStrike">
+                <a:solidFill>
+                  <a:srgbClr val="0066cc"/>
+                </a:solidFill>
+                <a:latin typeface="Arial"/>
+                <a:ea typeface="DejaVu Sans"/>
+              </a:rPr>
+              <a:t>Here we use numpy to create an array with thee rows and three columns. </a:t>
+            </a:r>
+            <a:endParaRPr b="0" lang="en-IE" sz="2800" spc="-1" strike="noStrike">
+              <a:latin typeface="Arial"/>
+            </a:endParaRPr>
+          </a:p>
+          <a:p>
+            <a:pPr marL="432000" indent="-322920">
+              <a:lnSpc>
+                <a:spcPct val="100000"/>
+              </a:lnSpc>
+              <a:spcBef>
+                <a:spcPts val="1417"/>
+              </a:spcBef>
+              <a:buClr>
+                <a:srgbClr val="000000"/>
+              </a:buClr>
+              <a:buSzPct val="45000"/>
+              <a:buFont typeface="Wingdings" charset="2"/>
+              <a:buChar char=""/>
+            </a:pPr>
+            <a:r>
+              <a:rPr b="0" lang="en-IE" sz="2800" spc="-1" strike="noStrike">
+                <a:solidFill>
+                  <a:srgbClr val="0066cc"/>
+                </a:solidFill>
+                <a:latin typeface="Arial"/>
+                <a:ea typeface="DejaVu Sans"/>
+              </a:rPr>
+              <a:t>The columns are ID, Name and Age</a:t>
+            </a:r>
+            <a:endParaRPr b="0" lang="en-IE" sz="2800" spc="-1" strike="noStrike">
+              <a:latin typeface="Arial"/>
+            </a:endParaRPr>
+          </a:p>
+          <a:p>
+            <a:pPr marL="432000" indent="-322920">
+              <a:lnSpc>
+                <a:spcPct val="100000"/>
+              </a:lnSpc>
+              <a:spcBef>
+                <a:spcPts val="1417"/>
+              </a:spcBef>
+              <a:buClr>
+                <a:srgbClr val="000000"/>
+              </a:buClr>
+              <a:buSzPct val="45000"/>
+              <a:buFont typeface="Wingdings" charset="2"/>
+              <a:buChar char=""/>
+            </a:pPr>
+            <a:r>
+              <a:rPr b="0" lang="en-IE" sz="2800" spc="-1" strike="noStrike">
+                <a:solidFill>
+                  <a:srgbClr val="0066cc"/>
+                </a:solidFill>
+                <a:latin typeface="Arial"/>
+                <a:ea typeface="DejaVu Sans"/>
+              </a:rPr>
+              <a:t>There are three rows of data. </a:t>
+            </a:r>
+            <a:endParaRPr b="0" lang="en-IE" sz="2800" spc="-1" strike="noStrike">
+              <a:latin typeface="Arial"/>
+            </a:endParaRPr>
+          </a:p>
+          <a:p>
+            <a:pPr marL="432000" indent="-322920">
+              <a:lnSpc>
+                <a:spcPct val="100000"/>
+              </a:lnSpc>
+              <a:spcBef>
+                <a:spcPts val="1417"/>
+              </a:spcBef>
+              <a:buClr>
+                <a:srgbClr val="000000"/>
+              </a:buClr>
+              <a:buSzPct val="45000"/>
+              <a:buFont typeface="Wingdings" charset="2"/>
+              <a:buChar char=""/>
+            </a:pPr>
+            <a:r>
+              <a:rPr b="0" lang="en-IE" sz="2800" spc="-1" strike="noStrike">
+                <a:solidFill>
+                  <a:srgbClr val="0066cc"/>
+                </a:solidFill>
+                <a:latin typeface="Arial"/>
+                <a:ea typeface="DejaVu Sans"/>
+              </a:rPr>
+              <a:t>We set the dataframe to contain the Name and Age values by slicing the dataframe. </a:t>
+            </a:r>
+            <a:endParaRPr b="0" lang="en-IE" sz="2800" spc="-1" strike="noStrike">
+              <a:latin typeface="Arial"/>
+            </a:endParaRPr>
+          </a:p>
+          <a:p>
+            <a:pPr marL="432000" indent="-322920">
+              <a:lnSpc>
+                <a:spcPct val="100000"/>
+              </a:lnSpc>
+              <a:spcBef>
+                <a:spcPts val="1417"/>
+              </a:spcBef>
+              <a:buClr>
+                <a:srgbClr val="000000"/>
+              </a:buClr>
+              <a:buSzPct val="45000"/>
+              <a:buFont typeface="Wingdings" charset="2"/>
+              <a:buChar char=""/>
+            </a:pPr>
+            <a:r>
+              <a:rPr b="0" lang="en-IE" sz="2800" spc="-1" strike="noStrike">
+                <a:solidFill>
+                  <a:srgbClr val="0066cc"/>
+                </a:solidFill>
+                <a:latin typeface="Arial"/>
+                <a:ea typeface="DejaVu Sans"/>
+              </a:rPr>
+              <a:t>We set the row index to be the first column of the array</a:t>
+            </a:r>
+            <a:endParaRPr b="0" lang="en-IE" sz="2800" spc="-1" strike="noStrike">
+              <a:latin typeface="Arial"/>
+            </a:endParaRPr>
+          </a:p>
+          <a:p>
+            <a:pPr marL="432000" indent="-322920">
+              <a:lnSpc>
+                <a:spcPct val="100000"/>
+              </a:lnSpc>
+              <a:spcBef>
+                <a:spcPts val="1417"/>
+              </a:spcBef>
+              <a:buClr>
+                <a:srgbClr val="000000"/>
+              </a:buClr>
+              <a:buSzPct val="45000"/>
+              <a:buFont typeface="Wingdings" charset="2"/>
+              <a:buChar char=""/>
+            </a:pPr>
+            <a:r>
+              <a:rPr b="0" lang="en-IE" sz="2800" spc="-1" strike="noStrike">
+                <a:solidFill>
+                  <a:srgbClr val="0066cc"/>
+                </a:solidFill>
+                <a:latin typeface="Arial"/>
+                <a:ea typeface="DejaVu Sans"/>
+              </a:rPr>
+              <a:t>We manually set the column indices values. </a:t>
+            </a:r>
+            <a:endParaRPr b="0" lang="en-IE" sz="2800" spc="-1" strike="noStrike">
+              <a:latin typeface="Arial"/>
+            </a:endParaRPr>
+          </a:p>
+        </p:txBody>
+      </p:sp>
+    </p:spTree>
+  </p:cSld>
+  <p:timing>
+    <p:tnLst>
+      <p:par>
+        <p:cTn id="81" dur="indefinite" restart="never" nodeType="tmRoot">
+          <p:childTnLst>
+            <p:seq>
+              <p:cTn id="82" dur="indefinite" nodeType="mainSeq"/>
+              <p:prevCondLst>
+                <p:cond delay="0" evt="onPrev">
+                  <p:tgtEl>
+                    <p:sldTgt/>
+                  </p:tgtEl>
+                </p:cond>
+              </p:prevCondLst>
+              <p:nextCondLst>
+                <p:cond delay="0" evt="onNext">
+                  <p:tgtEl>
+                    <p:sldTgt/>
+                  </p:tgtEl>
+                </p:cond>
+              </p:nextCondLst>
+            </p:seq>
+          </p:childTnLst>
+        </p:cTn>
+      </p:par>
+    </p:tnLst>
+  </p:timing>
+</p:sld>
+</file>
+
+<file path=ppt/slides/slide42.xml><?xml version="1.0" encoding="utf-8"?>
+<p:sld xmlns:a="http://schemas.openxmlformats.org/drawingml/2006/main" xmlns:p="http://schemas.openxmlformats.org/presentationml/2006/main" xmlns:r="http://schemas.openxmlformats.org/officeDocument/2006/relationships" xmlns:p14="http://schemas.microsoft.com/office/powerpoint/2010/main" xmlns:p15="http://schemas.microsoft.com/office/powerpoint/2012/main" xmlns:mc="http://schemas.openxmlformats.org/markup-compatibility/2006">
+  <p:cSld>
+    <p:spTree>
+      <p:nvGrpSpPr>
+        <p:cNvPr id="1" name=""/>
+        <p:cNvGrpSpPr/>
+        <p:nvPr/>
+      </p:nvGrpSpPr>
+      <p:grpSpPr>
+        <a:xfrm>
+          <a:off x="0" y="0"/>
+          <a:ext cx="0" cy="0"/>
+          <a:chOff x="0" y="0"/>
+          <a:chExt cx="0" cy="0"/>
+        </a:xfrm>
+      </p:grpSpPr>
+      <p:sp>
+        <p:nvSpPr>
+          <p:cNvPr id="173" name="CustomShape 1"/>
+          <p:cNvSpPr/>
+          <p:nvPr/>
+        </p:nvSpPr>
+        <p:spPr>
+          <a:xfrm>
+            <a:off x="504000" y="301320"/>
+            <a:ext cx="9070560" cy="636480"/>
+          </a:xfrm>
+          <a:prstGeom prst="rect">
+            <a:avLst/>
+          </a:prstGeom>
+          <a:noFill/>
+          <a:ln>
+            <a:noFill/>
+          </a:ln>
+        </p:spPr>
+        <p:style>
+          <a:lnRef idx="0"/>
+          <a:fillRef idx="0"/>
+          <a:effectRef idx="0"/>
+          <a:fontRef idx="minor"/>
+        </p:style>
+        <p:txBody>
+          <a:bodyPr lIns="0" rIns="0" tIns="0" bIns="0" anchor="ctr"/>
+          <a:p>
+            <a:pPr algn="ctr">
+              <a:lnSpc>
+                <a:spcPct val="100000"/>
+              </a:lnSpc>
+            </a:pPr>
+            <a:r>
+              <a:rPr b="0" lang="en-IE" sz="4400" spc="-1" strike="noStrike">
+                <a:solidFill>
+                  <a:srgbClr val="ffffff"/>
+                </a:solidFill>
+                <a:latin typeface="Arial"/>
+                <a:ea typeface="DejaVu Sans"/>
+              </a:rPr>
+              <a:t>Introduction to Pandas</a:t>
+            </a:r>
+            <a:endParaRPr b="0" lang="en-IE" sz="4400" spc="-1" strike="noStrike">
+              <a:latin typeface="Arial"/>
+            </a:endParaRPr>
+          </a:p>
+        </p:txBody>
+      </p:sp>
+      <p:sp>
+        <p:nvSpPr>
+          <p:cNvPr id="174" name="CustomShape 2"/>
+          <p:cNvSpPr/>
+          <p:nvPr/>
+        </p:nvSpPr>
+        <p:spPr>
+          <a:xfrm>
+            <a:off x="504000" y="1769040"/>
+            <a:ext cx="9070560" cy="4383360"/>
+          </a:xfrm>
+          <a:prstGeom prst="rect">
+            <a:avLst/>
+          </a:prstGeom>
+          <a:noFill/>
+          <a:ln>
+            <a:noFill/>
+          </a:ln>
+        </p:spPr>
+        <p:style>
+          <a:lnRef idx="0"/>
+          <a:fillRef idx="0"/>
+          <a:effectRef idx="0"/>
+          <a:fontRef idx="minor"/>
+        </p:style>
+        <p:txBody>
+          <a:bodyPr lIns="0" rIns="0" tIns="0" bIns="0"/>
+          <a:p>
+            <a:pPr>
+              <a:lnSpc>
+                <a:spcPct val="100000"/>
+              </a:lnSpc>
+              <a:spcBef>
+                <a:spcPts val="1417"/>
+              </a:spcBef>
+            </a:pPr>
+            <a:endParaRPr b="0" lang="en-IE" sz="1800" spc="-1" strike="noStrike">
+              <a:latin typeface="Arial"/>
+            </a:endParaRPr>
+          </a:p>
+          <a:p>
+            <a:pPr marL="432000" indent="-322920">
+              <a:lnSpc>
+                <a:spcPct val="100000"/>
+              </a:lnSpc>
+              <a:spcBef>
+                <a:spcPts val="1417"/>
+              </a:spcBef>
+              <a:buClr>
+                <a:srgbClr val="000000"/>
+              </a:buClr>
+              <a:buSzPct val="45000"/>
+              <a:buFont typeface="Wingdings" charset="2"/>
+              <a:buChar char=""/>
+            </a:pPr>
+            <a:r>
+              <a:rPr b="0" lang="en-IE" sz="2800" spc="-1" strike="noStrike">
+                <a:solidFill>
+                  <a:srgbClr val="0066cc"/>
+                </a:solidFill>
+                <a:latin typeface="Arial"/>
+                <a:ea typeface="DejaVu Sans"/>
+              </a:rPr>
+              <a:t>Note that we can use df.ix to access dataframe rows by integer index. </a:t>
+            </a:r>
+            <a:endParaRPr b="0" lang="en-IE" sz="2800" spc="-1" strike="noStrike">
+              <a:latin typeface="Arial"/>
+            </a:endParaRPr>
+          </a:p>
+          <a:p>
+            <a:pPr marL="432000" indent="-322920">
+              <a:lnSpc>
+                <a:spcPct val="100000"/>
+              </a:lnSpc>
+              <a:spcBef>
+                <a:spcPts val="1417"/>
+              </a:spcBef>
+              <a:buClr>
+                <a:srgbClr val="000000"/>
+              </a:buClr>
+              <a:buSzPct val="45000"/>
+              <a:buFont typeface="Wingdings" charset="2"/>
+              <a:buChar char=""/>
+            </a:pPr>
+            <a:r>
+              <a:rPr b="0" lang="en-IE" sz="2800" spc="-1" strike="noStrike">
+                <a:solidFill>
+                  <a:srgbClr val="0066cc"/>
+                </a:solidFill>
+                <a:latin typeface="Arial"/>
+                <a:ea typeface="DejaVu Sans"/>
+              </a:rPr>
+              <a:t>We can use df.loc to access dataframe rows and columns by locations</a:t>
+            </a:r>
+            <a:endParaRPr b="0" lang="en-IE" sz="2800" spc="-1" strike="noStrike">
+              <a:latin typeface="Arial"/>
+            </a:endParaRPr>
+          </a:p>
+        </p:txBody>
+      </p:sp>
+    </p:spTree>
+  </p:cSld>
+  <p:timing>
+    <p:tnLst>
+      <p:par>
+        <p:cTn id="83" dur="indefinite" restart="never" nodeType="tmRoot">
+          <p:childTnLst>
+            <p:seq>
+              <p:cTn id="84" dur="indefinite" nodeType="mainSeq"/>
+              <p:prevCondLst>
+                <p:cond delay="0" evt="onPrev">
+                  <p:tgtEl>
+                    <p:sldTgt/>
+                  </p:tgtEl>
+                </p:cond>
+              </p:prevCondLst>
+              <p:nextCondLst>
+                <p:cond delay="0" evt="onNext">
+                  <p:tgtEl>
+                    <p:sldTgt/>
+                  </p:tgtEl>
+                </p:cond>
+              </p:nextCondLst>
+            </p:seq>
+          </p:childTnLst>
+        </p:cTn>
+      </p:par>
+    </p:tnLst>
+  </p:timing>
+</p:sld>
+</file>
+
+<file path=ppt/slides/slide43.xml><?xml version="1.0" encoding="utf-8"?>
+<p:sld xmlns:a="http://schemas.openxmlformats.org/drawingml/2006/main" xmlns:p="http://schemas.openxmlformats.org/presentationml/2006/main" xmlns:r="http://schemas.openxmlformats.org/officeDocument/2006/relationships" xmlns:p14="http://schemas.microsoft.com/office/powerpoint/2010/main" xmlns:p15="http://schemas.microsoft.com/office/powerpoint/2012/main" xmlns:mc="http://schemas.openxmlformats.org/markup-compatibility/2006">
+  <p:cSld>
+    <p:spTree>
+      <p:nvGrpSpPr>
+        <p:cNvPr id="1" name=""/>
+        <p:cNvGrpSpPr/>
+        <p:nvPr/>
+      </p:nvGrpSpPr>
+      <p:grpSpPr>
+        <a:xfrm>
+          <a:off x="0" y="0"/>
+          <a:ext cx="0" cy="0"/>
+          <a:chOff x="0" y="0"/>
+          <a:chExt cx="0" cy="0"/>
+        </a:xfrm>
+      </p:grpSpPr>
+      <p:sp>
+        <p:nvSpPr>
+          <p:cNvPr id="175" name="CustomShape 1"/>
+          <p:cNvSpPr/>
+          <p:nvPr/>
+        </p:nvSpPr>
+        <p:spPr>
+          <a:xfrm>
+            <a:off x="504000" y="301320"/>
+            <a:ext cx="9070560" cy="636480"/>
+          </a:xfrm>
+          <a:prstGeom prst="rect">
+            <a:avLst/>
+          </a:prstGeom>
+          <a:noFill/>
+          <a:ln>
+            <a:noFill/>
+          </a:ln>
+        </p:spPr>
+        <p:style>
+          <a:lnRef idx="0"/>
+          <a:fillRef idx="0"/>
+          <a:effectRef idx="0"/>
+          <a:fontRef idx="minor"/>
+        </p:style>
+        <p:txBody>
+          <a:bodyPr lIns="0" rIns="0" tIns="0" bIns="0" anchor="ctr"/>
+          <a:p>
+            <a:pPr algn="ctr">
+              <a:lnSpc>
+                <a:spcPct val="100000"/>
+              </a:lnSpc>
+            </a:pPr>
+            <a:r>
+              <a:rPr b="0" lang="en-IE" sz="4400" spc="-1" strike="noStrike">
+                <a:solidFill>
+                  <a:srgbClr val="ffffff"/>
+                </a:solidFill>
+                <a:latin typeface="Arial"/>
+                <a:ea typeface="DejaVu Sans"/>
+              </a:rPr>
+              <a:t>Introduction to Pandas</a:t>
+            </a:r>
+            <a:endParaRPr b="0" lang="en-IE" sz="4400" spc="-1" strike="noStrike">
+              <a:latin typeface="Arial"/>
+            </a:endParaRPr>
+          </a:p>
+        </p:txBody>
+      </p:sp>
+      <p:sp>
+        <p:nvSpPr>
+          <p:cNvPr id="176" name="CustomShape 2"/>
+          <p:cNvSpPr/>
+          <p:nvPr/>
+        </p:nvSpPr>
+        <p:spPr>
+          <a:xfrm>
+            <a:off x="504000" y="1769040"/>
+            <a:ext cx="9070560" cy="4383360"/>
+          </a:xfrm>
+          <a:prstGeom prst="rect">
+            <a:avLst/>
+          </a:prstGeom>
+          <a:noFill/>
+          <a:ln>
+            <a:noFill/>
+          </a:ln>
+        </p:spPr>
+        <p:style>
+          <a:lnRef idx="0"/>
+          <a:fillRef idx="0"/>
+          <a:effectRef idx="0"/>
+          <a:fontRef idx="minor"/>
+        </p:style>
+        <p:txBody>
+          <a:bodyPr lIns="0" rIns="0" tIns="0" bIns="0"/>
+          <a:p>
+            <a:pPr>
+              <a:lnSpc>
+                <a:spcPct val="100000"/>
+              </a:lnSpc>
+              <a:spcBef>
+                <a:spcPts val="1417"/>
+              </a:spcBef>
+            </a:pPr>
+            <a:endParaRPr b="0" lang="en-IE" sz="1800" spc="-1" strike="noStrike">
+              <a:latin typeface="Arial"/>
+            </a:endParaRPr>
+          </a:p>
+          <a:p>
+            <a:pPr marL="432000" indent="-322920">
+              <a:lnSpc>
+                <a:spcPct val="100000"/>
+              </a:lnSpc>
+              <a:spcBef>
+                <a:spcPts val="1417"/>
+              </a:spcBef>
+              <a:buClr>
+                <a:srgbClr val="000000"/>
+              </a:buClr>
+              <a:buSzPct val="45000"/>
+              <a:buFont typeface="Wingdings" charset="2"/>
+              <a:buChar char=""/>
+            </a:pPr>
+            <a:r>
+              <a:rPr b="0" lang="en-IE" sz="2800" spc="-1" strike="noStrike">
+                <a:solidFill>
+                  <a:srgbClr val="0066cc"/>
+                </a:solidFill>
+                <a:latin typeface="Arial"/>
+                <a:ea typeface="DejaVu Sans"/>
+              </a:rPr>
+              <a:t>We can also add and delete columns and rows from a dataframe. </a:t>
+            </a:r>
+            <a:endParaRPr b="0" lang="en-IE" sz="2800" spc="-1" strike="noStrike">
+              <a:latin typeface="Arial"/>
+            </a:endParaRPr>
+          </a:p>
+          <a:p>
+            <a:pPr marL="432000" indent="-322920">
+              <a:lnSpc>
+                <a:spcPct val="100000"/>
+              </a:lnSpc>
+              <a:spcBef>
+                <a:spcPts val="1417"/>
+              </a:spcBef>
+              <a:buClr>
+                <a:srgbClr val="000000"/>
+              </a:buClr>
+              <a:buSzPct val="45000"/>
+              <a:buFont typeface="Wingdings" charset="2"/>
+              <a:buChar char=""/>
+            </a:pPr>
+            <a:r>
+              <a:rPr b="0" lang="en-IE" sz="2800" spc="-1" strike="noStrike">
+                <a:solidFill>
+                  <a:srgbClr val="0066cc"/>
+                </a:solidFill>
+                <a:latin typeface="Arial"/>
+                <a:ea typeface="DejaVu Sans"/>
+              </a:rPr>
+              <a:t>The next example illustrates this:</a:t>
+            </a:r>
+            <a:endParaRPr b="0" lang="en-IE" sz="2800" spc="-1" strike="noStrike">
+              <a:latin typeface="Arial"/>
+            </a:endParaRPr>
+          </a:p>
+        </p:txBody>
+      </p:sp>
+    </p:spTree>
+  </p:cSld>
+  <p:timing>
+    <p:tnLst>
+      <p:par>
+        <p:cTn id="85" dur="indefinite" restart="never" nodeType="tmRoot">
+          <p:childTnLst>
+            <p:seq>
+              <p:cTn id="86" dur="indefinite" nodeType="mainSeq"/>
+              <p:prevCondLst>
+                <p:cond delay="0" evt="onPrev">
+                  <p:tgtEl>
+                    <p:sldTgt/>
+                  </p:tgtEl>
+                </p:cond>
+              </p:prevCondLst>
+              <p:nextCondLst>
+                <p:cond delay="0" evt="onNext">
+                  <p:tgtEl>
+                    <p:sldTgt/>
+                  </p:tgtEl>
+                </p:cond>
+              </p:nextCondLst>
+            </p:seq>
+          </p:childTnLst>
+        </p:cTn>
+      </p:par>
+    </p:tnLst>
+  </p:timing>
+</p:sld>
+</file>
+
+<file path=ppt/slides/slide44.xml><?xml version="1.0" encoding="utf-8"?>
+<p:sld xmlns:a="http://schemas.openxmlformats.org/drawingml/2006/main" xmlns:p="http://schemas.openxmlformats.org/presentationml/2006/main" xmlns:r="http://schemas.openxmlformats.org/officeDocument/2006/relationships" xmlns:p14="http://schemas.microsoft.com/office/powerpoint/2010/main" xmlns:p15="http://schemas.microsoft.com/office/powerpoint/2012/main" xmlns:mc="http://schemas.openxmlformats.org/markup-compatibility/2006">
+  <p:cSld>
+    <p:spTree>
+      <p:nvGrpSpPr>
+        <p:cNvPr id="1" name=""/>
+        <p:cNvGrpSpPr/>
+        <p:nvPr/>
+      </p:nvGrpSpPr>
+      <p:grpSpPr>
+        <a:xfrm>
+          <a:off x="0" y="0"/>
+          <a:ext cx="0" cy="0"/>
+          <a:chOff x="0" y="0"/>
+          <a:chExt cx="0" cy="0"/>
+        </a:xfrm>
+      </p:grpSpPr>
+      <p:sp>
+        <p:nvSpPr>
+          <p:cNvPr id="177" name="CustomShape 1"/>
+          <p:cNvSpPr/>
+          <p:nvPr/>
+        </p:nvSpPr>
+        <p:spPr>
+          <a:xfrm>
+            <a:off x="504000" y="301320"/>
+            <a:ext cx="9070560" cy="636480"/>
+          </a:xfrm>
+          <a:prstGeom prst="rect">
+            <a:avLst/>
+          </a:prstGeom>
+          <a:noFill/>
+          <a:ln>
+            <a:noFill/>
+          </a:ln>
+        </p:spPr>
+        <p:style>
+          <a:lnRef idx="0"/>
+          <a:fillRef idx="0"/>
+          <a:effectRef idx="0"/>
+          <a:fontRef idx="minor"/>
+        </p:style>
+        <p:txBody>
+          <a:bodyPr lIns="0" rIns="0" tIns="0" bIns="0" anchor="ctr"/>
+          <a:p>
+            <a:pPr algn="ctr">
+              <a:lnSpc>
+                <a:spcPct val="100000"/>
+              </a:lnSpc>
+            </a:pPr>
+            <a:r>
+              <a:rPr b="0" lang="en-IE" sz="4400" spc="-1" strike="noStrike">
+                <a:solidFill>
+                  <a:srgbClr val="ffffff"/>
+                </a:solidFill>
+                <a:latin typeface="Arial"/>
+                <a:ea typeface="DejaVu Sans"/>
+              </a:rPr>
+              <a:t>Introduction to Numpy</a:t>
+            </a:r>
+            <a:endParaRPr b="0" lang="en-IE" sz="4400" spc="-1" strike="noStrike">
+              <a:latin typeface="Arial"/>
+            </a:endParaRPr>
+          </a:p>
+        </p:txBody>
+      </p:sp>
+      <p:sp>
+        <p:nvSpPr>
+          <p:cNvPr id="178" name="CustomShape 2"/>
+          <p:cNvSpPr/>
+          <p:nvPr/>
+        </p:nvSpPr>
+        <p:spPr>
+          <a:xfrm>
+            <a:off x="504000" y="1769040"/>
+            <a:ext cx="9070560" cy="4383360"/>
+          </a:xfrm>
+          <a:prstGeom prst="rect">
+            <a:avLst/>
+          </a:prstGeom>
+          <a:noFill/>
+          <a:ln>
+            <a:noFill/>
+          </a:ln>
+        </p:spPr>
+        <p:style>
+          <a:lnRef idx="0"/>
+          <a:fillRef idx="0"/>
+          <a:effectRef idx="0"/>
+          <a:fontRef idx="minor"/>
+        </p:style>
+      </p:sp>
+      <p:graphicFrame>
+        <p:nvGraphicFramePr>
+          <p:cNvPr id="179" name="Table 3"/>
+          <p:cNvGraphicFramePr/>
+          <p:nvPr/>
+        </p:nvGraphicFramePr>
+        <p:xfrm>
+          <a:off x="315720" y="1547640"/>
+          <a:ext cx="9467280" cy="1844640"/>
+        </p:xfrm>
+        <a:graphic>
+          <a:graphicData uri="http://schemas.openxmlformats.org/drawingml/2006/table">
+            <a:tbl>
+              <a:tblPr/>
+              <a:tblGrid>
+                <a:gridCol w="9467640"/>
+              </a:tblGrid>
+              <a:tr h="3979800">
+                <a:tc>
+                  <a:txBody>
+                    <a:bodyPr lIns="90000" rIns="90000"/>
+                    <a:p>
+                      <a:pPr>
+                        <a:lnSpc>
+                          <a:spcPct val="100000"/>
+                        </a:lnSpc>
+                      </a:pPr>
+                      <a:r>
+                        <a:rPr b="0" lang="en-IE" sz="1800" spc="-1" strike="noStrike">
+                          <a:latin typeface="Courier New"/>
+                        </a:rPr>
+                        <a:t>import pandas as pd</a:t>
+                      </a:r>
+                      <a:endParaRPr b="0" lang="en-IE" sz="1800" spc="-1" strike="noStrike">
+                        <a:latin typeface="Arial"/>
+                      </a:endParaRPr>
+                    </a:p>
+                    <a:p>
+                      <a:pPr>
+                        <a:lnSpc>
+                          <a:spcPct val="100000"/>
+                        </a:lnSpc>
+                      </a:pPr>
+                      <a:r>
+                        <a:rPr b="0" lang="en-IE" sz="1800" spc="-1" strike="noStrike">
+                          <a:latin typeface="Courier New"/>
+                        </a:rPr>
+                        <a:t>import numpy as np</a:t>
+                      </a:r>
+                      <a:endParaRPr b="0" lang="en-IE" sz="1800" spc="-1" strike="noStrike">
+                        <a:latin typeface="Arial"/>
+                      </a:endParaRPr>
+                    </a:p>
+                    <a:p>
+                      <a:pPr>
+                        <a:lnSpc>
+                          <a:spcPct val="100000"/>
+                        </a:lnSpc>
+                      </a:pPr>
+                      <a:r>
+                        <a:rPr b="0" lang="en-IE" sz="1800" spc="-1" strike="noStrike">
+                          <a:latin typeface="Courier New"/>
+                        </a:rPr>
+                        <a:t>data = np.array([['12345','Braun',21],['12346','David',22],['12347','Pat',23]])</a:t>
+                      </a:r>
+                      <a:endParaRPr b="0" lang="en-IE" sz="1800" spc="-1" strike="noStrike">
+                        <a:latin typeface="Arial"/>
+                      </a:endParaRPr>
+                    </a:p>
+                    <a:p>
+                      <a:pPr>
+                        <a:lnSpc>
+                          <a:spcPct val="100000"/>
+                        </a:lnSpc>
+                      </a:pPr>
+                      <a:r>
+                        <a:rPr b="0" lang="en-IE" sz="1800" spc="-1" strike="noStrike">
+                          <a:latin typeface="Courier New"/>
+                        </a:rPr>
+                        <a:t>df = pd.DataFrame(data[:,1:3],index=data[:,0],columns=['Name','Age'])</a:t>
+                      </a:r>
+                      <a:endParaRPr b="0" lang="en-IE" sz="1800" spc="-1" strike="noStrike">
+                        <a:latin typeface="Arial"/>
+                      </a:endParaRPr>
+                    </a:p>
+                    <a:p>
+                      <a:pPr>
+                        <a:lnSpc>
+                          <a:spcPct val="100000"/>
+                        </a:lnSpc>
+                      </a:pPr>
+                      <a:r>
+                        <a:rPr b="0" lang="en-IE" sz="1800" spc="-1" strike="noStrike">
+                          <a:latin typeface="Courier New"/>
+                        </a:rPr>
+                        <a:t>print (df)</a:t>
+                      </a:r>
+                      <a:endParaRPr b="0" lang="en-IE" sz="1800" spc="-1" strike="noStrike">
+                        <a:latin typeface="Arial"/>
+                      </a:endParaRPr>
+                    </a:p>
+                    <a:p>
+                      <a:pPr>
+                        <a:lnSpc>
+                          <a:spcPct val="100000"/>
+                        </a:lnSpc>
+                      </a:pPr>
+                      <a:r>
+                        <a:rPr b="0" lang="en-IE" sz="1800" spc="-1" strike="noStrike">
+                          <a:latin typeface="Courier New"/>
+                        </a:rPr>
+                        <a:t># Add a new column ‘Addr’ to the dataframe.</a:t>
+                      </a:r>
+                      <a:endParaRPr b="0" lang="en-IE" sz="1800" spc="-1" strike="noStrike">
+                        <a:latin typeface="Arial"/>
+                      </a:endParaRPr>
+                    </a:p>
+                    <a:p>
+                      <a:pPr>
+                        <a:lnSpc>
+                          <a:spcPct val="100000"/>
+                        </a:lnSpc>
+                      </a:pPr>
+                      <a:r>
+                        <a:rPr b="0" lang="en-IE" sz="1800" spc="-1" strike="noStrike">
+                          <a:latin typeface="Courier New"/>
+                        </a:rPr>
+                        <a:t>df[‘Addr’] = [‘1234 Main St.’,’1235 Main St.’,’1236 Main St.’]</a:t>
+                      </a:r>
+                      <a:endParaRPr b="0" lang="en-IE" sz="1800" spc="-1" strike="noStrike">
+                        <a:latin typeface="Arial"/>
+                      </a:endParaRPr>
+                    </a:p>
+                    <a:p>
+                      <a:pPr>
+                        <a:lnSpc>
+                          <a:spcPct val="100000"/>
+                        </a:lnSpc>
+                      </a:pPr>
+                      <a:endParaRPr b="0" lang="en-IE" sz="1800" spc="-1" strike="noStrike">
+                        <a:latin typeface="Arial"/>
+                      </a:endParaRPr>
+                    </a:p>
+                    <a:p>
+                      <a:pPr>
+                        <a:lnSpc>
+                          <a:spcPct val="100000"/>
+                        </a:lnSpc>
+                      </a:pPr>
+                      <a:r>
+                        <a:rPr b="0" lang="en-IE" sz="1800" spc="-1" strike="noStrike">
+                          <a:latin typeface="Courier New"/>
+                        </a:rPr>
+                        <a:t># Deleting a column from a dataframe</a:t>
+                      </a:r>
+                      <a:endParaRPr b="0" lang="en-IE" sz="1800" spc="-1" strike="noStrike">
+                        <a:latin typeface="Arial"/>
+                      </a:endParaRPr>
+                    </a:p>
+                    <a:p>
+                      <a:pPr>
+                        <a:lnSpc>
+                          <a:spcPct val="100000"/>
+                        </a:lnSpc>
+                      </a:pPr>
+                      <a:r>
+                        <a:rPr b="0" lang="en-IE" sz="1800" spc="-1" strike="noStrike">
+                          <a:latin typeface="Courier New"/>
+                        </a:rPr>
+                        <a:t>df.del(‘Addr’) </a:t>
+                      </a:r>
+                      <a:endParaRPr b="0" lang="en-IE" sz="1800" spc="-1" strike="noStrike">
+                        <a:latin typeface="Arial"/>
+                      </a:endParaRPr>
+                    </a:p>
+                    <a:p>
+                      <a:pPr>
+                        <a:lnSpc>
+                          <a:spcPct val="100000"/>
+                        </a:lnSpc>
+                      </a:pPr>
+                      <a:r>
+                        <a:rPr b="0" lang="en-IE" sz="1800" spc="-1" strike="noStrike">
+                          <a:latin typeface="Courier New"/>
+                        </a:rPr>
+                        <a:t> </a:t>
+                      </a:r>
+                      <a:endParaRPr b="0" lang="en-IE" sz="1800" spc="-1" strike="noStrike">
+                        <a:latin typeface="Arial"/>
+                      </a:endParaRPr>
+                    </a:p>
+                    <a:p>
+                      <a:pPr>
+                        <a:lnSpc>
+                          <a:spcPct val="100000"/>
+                        </a:lnSpc>
+                      </a:pPr>
+                      <a:r>
+                        <a:rPr b="0" lang="en-IE" sz="1800" spc="-1" strike="noStrike">
+                          <a:latin typeface="Courier New"/>
+                        </a:rPr>
+                        <a:t># Deleting a row from a dataframe</a:t>
+                      </a:r>
+                      <a:endParaRPr b="0" lang="en-IE" sz="1800" spc="-1" strike="noStrike">
+                        <a:latin typeface="Arial"/>
+                      </a:endParaRPr>
+                    </a:p>
+                    <a:p>
+                      <a:pPr>
+                        <a:lnSpc>
+                          <a:spcPct val="100000"/>
+                        </a:lnSpc>
+                      </a:pPr>
+                      <a:r>
+                        <a:rPr b="0" lang="en-IE" sz="1800" spc="-1" strike="noStrike">
+                          <a:latin typeface="Courier New"/>
+                        </a:rPr>
+                        <a:t>df.drop(0)</a:t>
+                      </a:r>
+                      <a:endParaRPr b="0" lang="en-IE" sz="1800" spc="-1" strike="noStrike">
+                        <a:latin typeface="Arial"/>
+                      </a:endParaRPr>
+                    </a:p>
+                    <a:p>
+                      <a:pPr>
+                        <a:lnSpc>
+                          <a:spcPct val="100000"/>
+                        </a:lnSpc>
+                      </a:pPr>
+                      <a:r>
+                        <a:rPr b="0" lang="en-IE" sz="1800" spc="-1" strike="noStrike">
+                          <a:latin typeface="Courier New"/>
+                        </a:rPr>
+                        <a:t>df.drop(‘12346’)</a:t>
+                      </a:r>
+                      <a:endParaRPr b="0" lang="en-IE" sz="1800" spc="-1" strike="noStrike">
+                        <a:latin typeface="Arial"/>
+                      </a:endParaRPr>
+                    </a:p>
+                    <a:p>
+                      <a:pPr>
+                        <a:lnSpc>
+                          <a:spcPct val="100000"/>
+                        </a:lnSpc>
+                      </a:pPr>
+                      <a:endParaRPr b="0" lang="en-IE" sz="1800" spc="-1" strike="noStrike">
+                        <a:latin typeface="Arial"/>
+                      </a:endParaRPr>
+                    </a:p>
+                  </a:txBody>
+                  <a:tcPr marL="90000" marR="90000">
+                    <a:lnL w="720">
+                      <a:solidFill>
+                        <a:srgbClr val="ffffff"/>
+                      </a:solidFill>
+                    </a:lnL>
+                    <a:lnR w="720">
+                      <a:solidFill>
+                        <a:srgbClr val="ffffff"/>
+                      </a:solidFill>
+                    </a:lnR>
+                    <a:lnT w="720">
+                      <a:solidFill>
+                        <a:srgbClr val="ffffff"/>
+                      </a:solidFill>
+                    </a:lnT>
+                    <a:lnB w="720">
+                      <a:solidFill>
+                        <a:srgbClr val="ffffff"/>
+                      </a:solidFill>
+                    </a:lnB>
+                    <a:solidFill>
+                      <a:srgbClr val="b3b3b3"/>
+                    </a:solidFill>
+                  </a:tcPr>
+                </a:tc>
+              </a:tr>
+            </a:tbl>
+          </a:graphicData>
+        </a:graphic>
+      </p:graphicFrame>
+    </p:spTree>
+  </p:cSld>
+  <p:timing>
+    <p:tnLst>
+      <p:par>
+        <p:cTn id="87" dur="indefinite" restart="never" nodeType="tmRoot">
+          <p:childTnLst>
+            <p:seq>
+              <p:cTn id="88" dur="indefinite" nodeType="mainSeq"/>
+              <p:prevCondLst>
+                <p:cond delay="0" evt="onPrev">
+                  <p:tgtEl>
+                    <p:sldTgt/>
+                  </p:tgtEl>
+                </p:cond>
+              </p:prevCondLst>
+              <p:nextCondLst>
+                <p:cond delay="0" evt="onNext">
+                  <p:tgtEl>
+                    <p:sldTgt/>
+                  </p:tgtEl>
+                </p:cond>
+              </p:nextCondLst>
+            </p:seq>
+          </p:childTnLst>
+        </p:cTn>
+      </p:par>
+    </p:tnLst>
+  </p:timing>
+</p:sld>
+</file>
+
+<file path=ppt/slides/slide45.xml><?xml version="1.0" encoding="utf-8"?>
+<p:sld xmlns:a="http://schemas.openxmlformats.org/drawingml/2006/main" xmlns:p="http://schemas.openxmlformats.org/presentationml/2006/main" xmlns:r="http://schemas.openxmlformats.org/officeDocument/2006/relationships" xmlns:p14="http://schemas.microsoft.com/office/powerpoint/2010/main" xmlns:p15="http://schemas.microsoft.com/office/powerpoint/2012/main" xmlns:mc="http://schemas.openxmlformats.org/markup-compatibility/2006">
+  <p:cSld>
+    <p:spTree>
+      <p:nvGrpSpPr>
+        <p:cNvPr id="1" name=""/>
+        <p:cNvGrpSpPr/>
+        <p:nvPr/>
+      </p:nvGrpSpPr>
+      <p:grpSpPr>
+        <a:xfrm>
+          <a:off x="0" y="0"/>
+          <a:ext cx="0" cy="0"/>
+          <a:chOff x="0" y="0"/>
+          <a:chExt cx="0" cy="0"/>
+        </a:xfrm>
+      </p:grpSpPr>
+      <p:sp>
+        <p:nvSpPr>
+          <p:cNvPr id="180" name="CustomShape 1"/>
+          <p:cNvSpPr/>
+          <p:nvPr/>
+        </p:nvSpPr>
+        <p:spPr>
+          <a:xfrm>
+            <a:off x="504000" y="301320"/>
+            <a:ext cx="9070560" cy="636480"/>
+          </a:xfrm>
+          <a:prstGeom prst="rect">
+            <a:avLst/>
+          </a:prstGeom>
+          <a:noFill/>
+          <a:ln>
+            <a:noFill/>
+          </a:ln>
+        </p:spPr>
+        <p:style>
+          <a:lnRef idx="0"/>
+          <a:fillRef idx="0"/>
+          <a:effectRef idx="0"/>
+          <a:fontRef idx="minor"/>
+        </p:style>
+        <p:txBody>
+          <a:bodyPr lIns="0" rIns="0" tIns="0" bIns="0" anchor="ctr"/>
+          <a:p>
+            <a:pPr algn="ctr">
+              <a:lnSpc>
+                <a:spcPct val="100000"/>
+              </a:lnSpc>
+            </a:pPr>
+            <a:r>
+              <a:rPr b="0" lang="en-IE" sz="4400" spc="-1" strike="noStrike">
+                <a:solidFill>
+                  <a:srgbClr val="ffffff"/>
+                </a:solidFill>
+                <a:latin typeface="Arial"/>
+                <a:ea typeface="DejaVu Sans"/>
+              </a:rPr>
+              <a:t>Introduction to Pandas</a:t>
+            </a:r>
+            <a:endParaRPr b="0" lang="en-IE" sz="4400" spc="-1" strike="noStrike">
+              <a:latin typeface="Arial"/>
+            </a:endParaRPr>
+          </a:p>
+        </p:txBody>
+      </p:sp>
+      <p:sp>
+        <p:nvSpPr>
+          <p:cNvPr id="181" name="CustomShape 2"/>
+          <p:cNvSpPr/>
+          <p:nvPr/>
+        </p:nvSpPr>
+        <p:spPr>
+          <a:xfrm>
+            <a:off x="504000" y="1769040"/>
+            <a:ext cx="9070560" cy="4383360"/>
+          </a:xfrm>
+          <a:prstGeom prst="rect">
+            <a:avLst/>
+          </a:prstGeom>
+          <a:noFill/>
+          <a:ln>
+            <a:noFill/>
+          </a:ln>
+        </p:spPr>
+        <p:style>
+          <a:lnRef idx="0"/>
+          <a:fillRef idx="0"/>
+          <a:effectRef idx="0"/>
+          <a:fontRef idx="minor"/>
+        </p:style>
+        <p:txBody>
+          <a:bodyPr lIns="0" rIns="0" tIns="0" bIns="0"/>
+          <a:p>
+            <a:pPr>
+              <a:lnSpc>
+                <a:spcPct val="100000"/>
+              </a:lnSpc>
+              <a:spcBef>
+                <a:spcPts val="1417"/>
+              </a:spcBef>
+            </a:pPr>
+            <a:endParaRPr b="0" lang="en-IE" sz="1800" spc="-1" strike="noStrike">
+              <a:latin typeface="Arial"/>
+            </a:endParaRPr>
+          </a:p>
+          <a:p>
+            <a:pPr marL="432000" indent="-322920">
+              <a:lnSpc>
+                <a:spcPct val="100000"/>
+              </a:lnSpc>
+              <a:spcBef>
+                <a:spcPts val="1417"/>
+              </a:spcBef>
+              <a:buClr>
+                <a:srgbClr val="000000"/>
+              </a:buClr>
+              <a:buSzPct val="45000"/>
+              <a:buFont typeface="Wingdings" charset="2"/>
+              <a:buChar char=""/>
+            </a:pPr>
+            <a:r>
+              <a:rPr b="0" lang="en-IE" sz="2800" spc="-1" strike="noStrike">
+                <a:solidFill>
+                  <a:srgbClr val="0066cc"/>
+                </a:solidFill>
+                <a:latin typeface="Arial"/>
+                <a:ea typeface="DejaVu Sans"/>
+              </a:rPr>
+              <a:t>Dataframes also provide some very useful methods when analyzing data. </a:t>
+            </a:r>
+            <a:endParaRPr b="0" lang="en-IE" sz="2800" spc="-1" strike="noStrike">
+              <a:latin typeface="Arial"/>
+            </a:endParaRPr>
+          </a:p>
+          <a:p>
+            <a:pPr marL="432000" indent="-322920">
+              <a:lnSpc>
+                <a:spcPct val="100000"/>
+              </a:lnSpc>
+              <a:spcBef>
+                <a:spcPts val="1417"/>
+              </a:spcBef>
+              <a:buClr>
+                <a:srgbClr val="000000"/>
+              </a:buClr>
+              <a:buSzPct val="45000"/>
+              <a:buFont typeface="Wingdings" charset="2"/>
+              <a:buChar char=""/>
+            </a:pPr>
+            <a:r>
+              <a:rPr b="0" lang="en-IE" sz="2800" spc="-1" strike="noStrike">
+                <a:solidFill>
+                  <a:srgbClr val="0066cc"/>
+                </a:solidFill>
+                <a:latin typeface="Arial"/>
+                <a:ea typeface="DejaVu Sans"/>
+              </a:rPr>
+              <a:t>Common methods used are:</a:t>
+            </a:r>
+            <a:endParaRPr b="0" lang="en-IE" sz="2800" spc="-1" strike="noStrike">
+              <a:latin typeface="Arial"/>
+            </a:endParaRPr>
+          </a:p>
+          <a:p>
+            <a:pPr lvl="3" marL="864000" indent="-216000">
+              <a:lnSpc>
+                <a:spcPct val="100000"/>
+              </a:lnSpc>
+              <a:spcBef>
+                <a:spcPts val="1417"/>
+              </a:spcBef>
+              <a:buClr>
+                <a:srgbClr val="000000"/>
+              </a:buClr>
+              <a:buSzPct val="45000"/>
+              <a:buFont typeface="Wingdings" charset="2"/>
+              <a:buChar char=""/>
+            </a:pPr>
+            <a:r>
+              <a:rPr b="0" lang="en-IE" sz="2800" spc="-1" strike="noStrike">
+                <a:solidFill>
+                  <a:srgbClr val="0066cc"/>
+                </a:solidFill>
+                <a:latin typeface="Arial"/>
+                <a:ea typeface="DejaVu Sans"/>
+              </a:rPr>
+              <a:t>df.describe(): Gives basic statistics about the dataframe</a:t>
+            </a:r>
+            <a:endParaRPr b="0" lang="en-IE" sz="2800" spc="-1" strike="noStrike">
+              <a:latin typeface="Arial"/>
+            </a:endParaRPr>
+          </a:p>
+          <a:p>
+            <a:pPr lvl="3" marL="864000" indent="-216000">
+              <a:lnSpc>
+                <a:spcPct val="100000"/>
+              </a:lnSpc>
+              <a:spcBef>
+                <a:spcPts val="1417"/>
+              </a:spcBef>
+              <a:buClr>
+                <a:srgbClr val="000000"/>
+              </a:buClr>
+              <a:buSzPct val="45000"/>
+              <a:buFont typeface="Wingdings" charset="2"/>
+              <a:buChar char=""/>
+            </a:pPr>
+            <a:r>
+              <a:rPr b="0" lang="en-IE" sz="2800" spc="-1" strike="noStrike">
+                <a:solidFill>
+                  <a:srgbClr val="0066cc"/>
+                </a:solidFill>
+                <a:latin typeface="Arial"/>
+                <a:ea typeface="DejaVu Sans"/>
+              </a:rPr>
+              <a:t>df.head(n) prints the first n rows of the dataframe</a:t>
+            </a:r>
+            <a:endParaRPr b="0" lang="en-IE" sz="2800" spc="-1" strike="noStrike">
+              <a:latin typeface="Arial"/>
+            </a:endParaRPr>
+          </a:p>
+          <a:p>
+            <a:pPr lvl="3" marL="864000" indent="-216000">
+              <a:lnSpc>
+                <a:spcPct val="100000"/>
+              </a:lnSpc>
+              <a:spcBef>
+                <a:spcPts val="1417"/>
+              </a:spcBef>
+              <a:buClr>
+                <a:srgbClr val="000000"/>
+              </a:buClr>
+              <a:buSzPct val="45000"/>
+              <a:buFont typeface="Wingdings" charset="2"/>
+              <a:buChar char=""/>
+            </a:pPr>
+            <a:r>
+              <a:rPr b="0" lang="en-IE" sz="2800" spc="-1" strike="noStrike">
+                <a:solidFill>
+                  <a:srgbClr val="0066cc"/>
+                </a:solidFill>
+                <a:latin typeface="Arial"/>
+                <a:ea typeface="DejaVu Sans"/>
+              </a:rPr>
+              <a:t>df.shape() Returns a tuple containing the shape of the dataframe</a:t>
+            </a:r>
+            <a:endParaRPr b="0" lang="en-IE" sz="2800" spc="-1" strike="noStrike">
+              <a:latin typeface="Arial"/>
+            </a:endParaRPr>
+          </a:p>
+        </p:txBody>
+      </p:sp>
+    </p:spTree>
+  </p:cSld>
+  <p:timing>
+    <p:tnLst>
+      <p:par>
+        <p:cTn id="89" dur="indefinite" restart="never" nodeType="tmRoot">
+          <p:childTnLst>
+            <p:seq>
+              <p:cTn id="90" dur="indefinite" nodeType="mainSeq"/>
+              <p:prevCondLst>
+                <p:cond delay="0" evt="onPrev">
+                  <p:tgtEl>
+                    <p:sldTgt/>
+                  </p:tgtEl>
+                </p:cond>
+              </p:prevCondLst>
+              <p:nextCondLst>
+                <p:cond delay="0" evt="onNext">
+                  <p:tgtEl>
+                    <p:sldTgt/>
+                  </p:tgtEl>
+                </p:cond>
+              </p:nextCondLst>
+            </p:seq>
+          </p:childTnLst>
+        </p:cTn>
+      </p:par>
+    </p:tnLst>
+  </p:timing>
+</p:sld>
+</file>
+
+<file path=ppt/slides/slide46.xml><?xml version="1.0" encoding="utf-8"?>
+<p:sld xmlns:a="http://schemas.openxmlformats.org/drawingml/2006/main" xmlns:p="http://schemas.openxmlformats.org/presentationml/2006/main" xmlns:r="http://schemas.openxmlformats.org/officeDocument/2006/relationships" xmlns:p14="http://schemas.microsoft.com/office/powerpoint/2010/main" xmlns:p15="http://schemas.microsoft.com/office/powerpoint/2012/main" xmlns:mc="http://schemas.openxmlformats.org/markup-compatibility/2006">
+  <p:cSld>
+    <p:spTree>
+      <p:nvGrpSpPr>
+        <p:cNvPr id="1" name=""/>
+        <p:cNvGrpSpPr/>
+        <p:nvPr/>
+      </p:nvGrpSpPr>
+      <p:grpSpPr>
+        <a:xfrm>
+          <a:off x="0" y="0"/>
+          <a:ext cx="0" cy="0"/>
+          <a:chOff x="0" y="0"/>
+          <a:chExt cx="0" cy="0"/>
+        </a:xfrm>
+      </p:grpSpPr>
+      <p:sp>
+        <p:nvSpPr>
+          <p:cNvPr id="182" name="CustomShape 1"/>
+          <p:cNvSpPr/>
+          <p:nvPr/>
+        </p:nvSpPr>
+        <p:spPr>
+          <a:xfrm>
+            <a:off x="504000" y="301320"/>
+            <a:ext cx="9070560" cy="636480"/>
+          </a:xfrm>
+          <a:prstGeom prst="rect">
+            <a:avLst/>
+          </a:prstGeom>
+          <a:noFill/>
+          <a:ln>
+            <a:noFill/>
+          </a:ln>
+        </p:spPr>
+        <p:style>
+          <a:lnRef idx="0"/>
+          <a:fillRef idx="0"/>
+          <a:effectRef idx="0"/>
+          <a:fontRef idx="minor"/>
+        </p:style>
+        <p:txBody>
+          <a:bodyPr lIns="0" rIns="0" tIns="0" bIns="0" anchor="ctr"/>
+          <a:p>
+            <a:pPr algn="ctr">
+              <a:lnSpc>
+                <a:spcPct val="100000"/>
+              </a:lnSpc>
+            </a:pPr>
+            <a:r>
+              <a:rPr b="0" lang="en-IE" sz="4400" spc="-1" strike="noStrike">
+                <a:solidFill>
+                  <a:srgbClr val="ffffff"/>
+                </a:solidFill>
+                <a:latin typeface="Arial"/>
+                <a:ea typeface="DejaVu Sans"/>
+              </a:rPr>
+              <a:t>Introduction to Pandas</a:t>
+            </a:r>
+            <a:endParaRPr b="0" lang="en-IE" sz="4400" spc="-1" strike="noStrike">
+              <a:latin typeface="Arial"/>
+            </a:endParaRPr>
+          </a:p>
+        </p:txBody>
+      </p:sp>
+      <p:sp>
+        <p:nvSpPr>
+          <p:cNvPr id="183" name="CustomShape 2"/>
+          <p:cNvSpPr/>
+          <p:nvPr/>
+        </p:nvSpPr>
+        <p:spPr>
+          <a:xfrm>
+            <a:off x="504000" y="1769040"/>
+            <a:ext cx="9070560" cy="4383360"/>
+          </a:xfrm>
+          <a:prstGeom prst="rect">
+            <a:avLst/>
+          </a:prstGeom>
+          <a:noFill/>
+          <a:ln>
+            <a:noFill/>
+          </a:ln>
+        </p:spPr>
+        <p:style>
+          <a:lnRef idx="0"/>
+          <a:fillRef idx="0"/>
+          <a:effectRef idx="0"/>
+          <a:fontRef idx="minor"/>
+        </p:style>
+        <p:txBody>
+          <a:bodyPr lIns="0" rIns="0" tIns="0" bIns="0"/>
+          <a:p>
+            <a:pPr>
+              <a:lnSpc>
+                <a:spcPct val="100000"/>
+              </a:lnSpc>
+              <a:spcBef>
+                <a:spcPts val="1417"/>
+              </a:spcBef>
+            </a:pPr>
+            <a:endParaRPr b="0" lang="en-IE" sz="1800" spc="-1" strike="noStrike">
+              <a:latin typeface="Arial"/>
+            </a:endParaRPr>
+          </a:p>
+          <a:p>
+            <a:pPr marL="432000" indent="-322920">
+              <a:lnSpc>
+                <a:spcPct val="100000"/>
+              </a:lnSpc>
+              <a:spcBef>
+                <a:spcPts val="1417"/>
+              </a:spcBef>
+              <a:buClr>
+                <a:srgbClr val="000000"/>
+              </a:buClr>
+              <a:buSzPct val="45000"/>
+              <a:buFont typeface="Wingdings" charset="2"/>
+              <a:buChar char=""/>
+            </a:pPr>
+            <a:r>
+              <a:rPr b="0" lang="en-IE" sz="2800" spc="-1" strike="noStrike">
+                <a:solidFill>
+                  <a:srgbClr val="0066cc"/>
+                </a:solidFill>
+                <a:latin typeface="Arial"/>
+                <a:ea typeface="DejaVu Sans"/>
+              </a:rPr>
+              <a:t>Pandas also provides a number of aggregate methods for dataframes. </a:t>
+            </a:r>
+            <a:endParaRPr b="0" lang="en-IE" sz="2800" spc="-1" strike="noStrike">
+              <a:latin typeface="Arial"/>
+            </a:endParaRPr>
+          </a:p>
+          <a:p>
+            <a:pPr marL="432000" indent="-322920">
+              <a:lnSpc>
+                <a:spcPct val="100000"/>
+              </a:lnSpc>
+              <a:spcBef>
+                <a:spcPts val="1417"/>
+              </a:spcBef>
+              <a:buClr>
+                <a:srgbClr val="000000"/>
+              </a:buClr>
+              <a:buSzPct val="45000"/>
+              <a:buFont typeface="Wingdings" charset="2"/>
+              <a:buChar char=""/>
+            </a:pPr>
+            <a:r>
+              <a:rPr b="0" lang="en-IE" sz="2800" spc="-1" strike="noStrike">
+                <a:solidFill>
+                  <a:srgbClr val="0066cc"/>
+                </a:solidFill>
+                <a:latin typeface="Arial"/>
+                <a:ea typeface="DejaVu Sans"/>
+              </a:rPr>
+              <a:t>These rows take an axis parameter (rows or columns) which defaults to ‘0’ (rows). </a:t>
+            </a:r>
+            <a:endParaRPr b="0" lang="en-IE" sz="2800" spc="-1" strike="noStrike">
+              <a:latin typeface="Arial"/>
+            </a:endParaRPr>
+          </a:p>
+          <a:p>
+            <a:pPr marL="432000" indent="-322920">
+              <a:lnSpc>
+                <a:spcPct val="100000"/>
+              </a:lnSpc>
+              <a:spcBef>
+                <a:spcPts val="1417"/>
+              </a:spcBef>
+              <a:buClr>
+                <a:srgbClr val="000000"/>
+              </a:buClr>
+              <a:buSzPct val="45000"/>
+              <a:buFont typeface="Wingdings" charset="2"/>
+              <a:buChar char=""/>
+            </a:pPr>
+            <a:r>
+              <a:rPr b="0" lang="en-IE" sz="2800" spc="-1" strike="noStrike">
+                <a:solidFill>
+                  <a:srgbClr val="0066cc"/>
+                </a:solidFill>
+                <a:latin typeface="Arial"/>
+                <a:ea typeface="DejaVu Sans"/>
+              </a:rPr>
+              <a:t>These methods include:</a:t>
+            </a:r>
+            <a:endParaRPr b="0" lang="en-IE" sz="2800" spc="-1" strike="noStrike">
+              <a:latin typeface="Arial"/>
+            </a:endParaRPr>
+          </a:p>
+          <a:p>
+            <a:pPr lvl="3" marL="864000" indent="-216000">
+              <a:lnSpc>
+                <a:spcPct val="100000"/>
+              </a:lnSpc>
+              <a:spcBef>
+                <a:spcPts val="1417"/>
+              </a:spcBef>
+              <a:buClr>
+                <a:srgbClr val="000000"/>
+              </a:buClr>
+              <a:buSzPct val="45000"/>
+              <a:buFont typeface="Wingdings" charset="2"/>
+              <a:buChar char=""/>
+            </a:pPr>
+            <a:r>
+              <a:rPr b="0" lang="en-IE" sz="2800" spc="-1" strike="noStrike">
+                <a:solidFill>
+                  <a:srgbClr val="0066cc"/>
+                </a:solidFill>
+                <a:latin typeface="Arial"/>
+                <a:ea typeface="DejaVu Sans"/>
+              </a:rPr>
+              <a:t>df.count – Counts number of non-null fields</a:t>
+            </a:r>
+            <a:endParaRPr b="0" lang="en-IE" sz="2800" spc="-1" strike="noStrike">
+              <a:latin typeface="Arial"/>
+            </a:endParaRPr>
+          </a:p>
+          <a:p>
+            <a:pPr lvl="3" marL="864000" indent="-216000">
+              <a:lnSpc>
+                <a:spcPct val="100000"/>
+              </a:lnSpc>
+              <a:spcBef>
+                <a:spcPts val="1417"/>
+              </a:spcBef>
+              <a:buClr>
+                <a:srgbClr val="000000"/>
+              </a:buClr>
+              <a:buSzPct val="45000"/>
+              <a:buFont typeface="Wingdings" charset="2"/>
+              <a:buChar char=""/>
+            </a:pPr>
+            <a:r>
+              <a:rPr b="0" lang="en-IE" sz="2800" spc="-1" strike="noStrike">
+                <a:solidFill>
+                  <a:srgbClr val="0066cc"/>
+                </a:solidFill>
+                <a:latin typeface="Arial"/>
+                <a:ea typeface="DejaVu Sans"/>
+              </a:rPr>
+              <a:t>df.sum – Sums over the rows or columnns</a:t>
+            </a:r>
+            <a:endParaRPr b="0" lang="en-IE" sz="2800" spc="-1" strike="noStrike">
+              <a:latin typeface="Arial"/>
+            </a:endParaRPr>
+          </a:p>
+          <a:p>
+            <a:pPr lvl="3" marL="864000" indent="-216000">
+              <a:lnSpc>
+                <a:spcPct val="100000"/>
+              </a:lnSpc>
+              <a:spcBef>
+                <a:spcPts val="1417"/>
+              </a:spcBef>
+              <a:buClr>
+                <a:srgbClr val="000000"/>
+              </a:buClr>
+              <a:buSzPct val="45000"/>
+              <a:buFont typeface="Wingdings" charset="2"/>
+              <a:buChar char=""/>
+            </a:pPr>
+            <a:r>
+              <a:rPr b="0" lang="en-IE" sz="2800" spc="-1" strike="noStrike">
+                <a:solidFill>
+                  <a:srgbClr val="0066cc"/>
+                </a:solidFill>
+                <a:latin typeface="Arial"/>
+                <a:ea typeface="DejaVu Sans"/>
+              </a:rPr>
+              <a:t>df.mean – Returns the average value</a:t>
+            </a:r>
+            <a:endParaRPr b="0" lang="en-IE" sz="2800" spc="-1" strike="noStrike">
+              <a:latin typeface="Arial"/>
+            </a:endParaRPr>
+          </a:p>
+        </p:txBody>
+      </p:sp>
+    </p:spTree>
+  </p:cSld>
+  <p:timing>
+    <p:tnLst>
+      <p:par>
+        <p:cTn id="91" dur="indefinite" restart="never" nodeType="tmRoot">
+          <p:childTnLst>
+            <p:seq>
+              <p:cTn id="92" dur="indefinite" nodeType="mainSeq"/>
               <p:prevCondLst>
                 <p:cond delay="0" evt="onPrev">
                   <p:tgtEl>

</xml_diff>